<commit_message>
Changes Updated In PPt
</commit_message>
<xml_diff>
--- a/documents/Codefury_2020.pptx
+++ b/documents/Codefury_2020.pptx
@@ -266,7 +266,7 @@
           <a:p>
             <a:fld id="{F44A6947-4F10-44F7-AEC1-B1AEB0D78DC7}" type="datetimeFigureOut">
               <a:rPr lang="en-IN" smtClean="0"/>
-              <a:t>11-10-2020</a:t>
+              <a:t>12-10-2020</a:t>
             </a:fld>
             <a:endParaRPr lang="en-IN"/>
           </a:p>
@@ -466,7 +466,7 @@
           <a:p>
             <a:fld id="{F44A6947-4F10-44F7-AEC1-B1AEB0D78DC7}" type="datetimeFigureOut">
               <a:rPr lang="en-IN" smtClean="0"/>
-              <a:t>11-10-2020</a:t>
+              <a:t>12-10-2020</a:t>
             </a:fld>
             <a:endParaRPr lang="en-IN"/>
           </a:p>
@@ -676,7 +676,7 @@
           <a:p>
             <a:fld id="{F44A6947-4F10-44F7-AEC1-B1AEB0D78DC7}" type="datetimeFigureOut">
               <a:rPr lang="en-IN" smtClean="0"/>
-              <a:t>11-10-2020</a:t>
+              <a:t>12-10-2020</a:t>
             </a:fld>
             <a:endParaRPr lang="en-IN"/>
           </a:p>
@@ -876,7 +876,7 @@
           <a:p>
             <a:fld id="{F44A6947-4F10-44F7-AEC1-B1AEB0D78DC7}" type="datetimeFigureOut">
               <a:rPr lang="en-IN" smtClean="0"/>
-              <a:t>11-10-2020</a:t>
+              <a:t>12-10-2020</a:t>
             </a:fld>
             <a:endParaRPr lang="en-IN"/>
           </a:p>
@@ -1152,7 +1152,7 @@
           <a:p>
             <a:fld id="{F44A6947-4F10-44F7-AEC1-B1AEB0D78DC7}" type="datetimeFigureOut">
               <a:rPr lang="en-IN" smtClean="0"/>
-              <a:t>11-10-2020</a:t>
+              <a:t>12-10-2020</a:t>
             </a:fld>
             <a:endParaRPr lang="en-IN"/>
           </a:p>
@@ -1420,7 +1420,7 @@
           <a:p>
             <a:fld id="{F44A6947-4F10-44F7-AEC1-B1AEB0D78DC7}" type="datetimeFigureOut">
               <a:rPr lang="en-IN" smtClean="0"/>
-              <a:t>11-10-2020</a:t>
+              <a:t>12-10-2020</a:t>
             </a:fld>
             <a:endParaRPr lang="en-IN"/>
           </a:p>
@@ -1835,7 +1835,7 @@
           <a:p>
             <a:fld id="{F44A6947-4F10-44F7-AEC1-B1AEB0D78DC7}" type="datetimeFigureOut">
               <a:rPr lang="en-IN" smtClean="0"/>
-              <a:t>11-10-2020</a:t>
+              <a:t>12-10-2020</a:t>
             </a:fld>
             <a:endParaRPr lang="en-IN"/>
           </a:p>
@@ -1977,7 +1977,7 @@
           <a:p>
             <a:fld id="{F44A6947-4F10-44F7-AEC1-B1AEB0D78DC7}" type="datetimeFigureOut">
               <a:rPr lang="en-IN" smtClean="0"/>
-              <a:t>11-10-2020</a:t>
+              <a:t>12-10-2020</a:t>
             </a:fld>
             <a:endParaRPr lang="en-IN"/>
           </a:p>
@@ -2090,7 +2090,7 @@
           <a:p>
             <a:fld id="{F44A6947-4F10-44F7-AEC1-B1AEB0D78DC7}" type="datetimeFigureOut">
               <a:rPr lang="en-IN" smtClean="0"/>
-              <a:t>11-10-2020</a:t>
+              <a:t>12-10-2020</a:t>
             </a:fld>
             <a:endParaRPr lang="en-IN"/>
           </a:p>
@@ -2403,7 +2403,7 @@
           <a:p>
             <a:fld id="{F44A6947-4F10-44F7-AEC1-B1AEB0D78DC7}" type="datetimeFigureOut">
               <a:rPr lang="en-IN" smtClean="0"/>
-              <a:t>11-10-2020</a:t>
+              <a:t>12-10-2020</a:t>
             </a:fld>
             <a:endParaRPr lang="en-IN"/>
           </a:p>
@@ -2692,7 +2692,7 @@
           <a:p>
             <a:fld id="{F44A6947-4F10-44F7-AEC1-B1AEB0D78DC7}" type="datetimeFigureOut">
               <a:rPr lang="en-IN" smtClean="0"/>
-              <a:t>11-10-2020</a:t>
+              <a:t>12-10-2020</a:t>
             </a:fld>
             <a:endParaRPr lang="en-IN"/>
           </a:p>
@@ -2935,7 +2935,7 @@
           <a:p>
             <a:fld id="{F44A6947-4F10-44F7-AEC1-B1AEB0D78DC7}" type="datetimeFigureOut">
               <a:rPr lang="en-IN" smtClean="0"/>
-              <a:t>11-10-2020</a:t>
+              <a:t>12-10-2020</a:t>
             </a:fld>
             <a:endParaRPr lang="en-IN"/>
           </a:p>
@@ -3600,7 +3600,7 @@
               <a:t> </a:t>
             </a:r>
             <a:r>
-              <a:rPr lang="en-IN" dirty="0" err="1" smtClean="0"/>
+              <a:rPr lang="en-IN" dirty="0" err="1"/>
               <a:t>Chaudhari</a:t>
             </a:r>
             <a:endParaRPr lang="en-IN" dirty="0"/>
@@ -3630,7 +3630,7 @@
               <a:t> </a:t>
             </a:r>
             <a:r>
-              <a:rPr lang="en-IN" dirty="0" err="1" smtClean="0"/>
+              <a:rPr lang="en-IN" dirty="0" err="1"/>
               <a:t>Adusumalli</a:t>
             </a:r>
             <a:endParaRPr lang="en-IN" dirty="0"/>
@@ -3644,6 +3644,11 @@
               <a:rPr lang="en-IN" dirty="0"/>
               <a:t> </a:t>
             </a:r>
+            <a:r>
+              <a:rPr lang="en-IN" dirty="0" err="1"/>
+              <a:t>Khochikar</a:t>
+            </a:r>
+            <a:endParaRPr lang="en-IN" dirty="0"/>
           </a:p>
           <a:p>
             <a:r>
@@ -3757,6 +3762,10 @@
           </p:nvPr>
         </p:nvSpPr>
         <p:spPr>
+          <a:xfrm>
+            <a:off x="623454" y="365125"/>
+            <a:ext cx="10515600" cy="1325563"/>
+          </a:xfrm>
           <a:blipFill>
             <a:blip r:embed="rId2">
               <a:alphaModFix amt="72000"/>
@@ -3786,7 +3795,7 @@
         <p:spPr>
           <a:xfrm>
             <a:off x="590203" y="1690688"/>
-            <a:ext cx="10548851" cy="4524315"/>
+            <a:ext cx="10548851" cy="4955203"/>
           </a:xfrm>
           <a:prstGeom prst="rect">
             <a:avLst/>
@@ -3800,132 +3809,186 @@
           <a:lstStyle/>
           <a:p>
             <a:r>
-              <a:rPr lang="en-IN" dirty="0" smtClean="0"/>
-              <a:t>A web based app for online bidding.</a:t>
-            </a:r>
-          </a:p>
-          <a:p>
-            <a:endParaRPr lang="en-IN" dirty="0" smtClean="0"/>
+              <a:rPr lang="en-IN" sz="2200" dirty="0"/>
+              <a:t>A web based app for online bidding</a:t>
+            </a:r>
+          </a:p>
+          <a:p>
+            <a:endParaRPr lang="en-IN" dirty="0"/>
+          </a:p>
+          <a:p>
+            <a:pPr marL="342900" indent="-342900">
+              <a:buFont typeface="Wingdings" panose="05000000000000000000" pitchFamily="2" charset="2"/>
+              <a:buChar char="§"/>
+            </a:pPr>
+            <a:r>
+              <a:rPr lang="en-IN" sz="2000" dirty="0">
+                <a:solidFill>
+                  <a:schemeClr val="bg2">
+                    <a:lumMod val="10000"/>
+                  </a:schemeClr>
+                </a:solidFill>
+              </a:rPr>
+              <a:t>Buyer Portal</a:t>
+            </a:r>
+          </a:p>
+          <a:p>
+            <a:pPr marL="800100" lvl="1" indent="-342900">
+              <a:buFont typeface="Wingdings" panose="05000000000000000000" pitchFamily="2" charset="2"/>
+              <a:buChar char="§"/>
+            </a:pPr>
+            <a:r>
+              <a:rPr lang="en-IN" sz="2000" dirty="0">
+                <a:solidFill>
+                  <a:schemeClr val="bg2">
+                    <a:lumMod val="10000"/>
+                  </a:schemeClr>
+                </a:solidFill>
+              </a:rPr>
+              <a:t>Active products for bidding</a:t>
+            </a:r>
+          </a:p>
+          <a:p>
+            <a:pPr marL="800100" lvl="1" indent="-342900">
+              <a:buFont typeface="Wingdings" panose="05000000000000000000" pitchFamily="2" charset="2"/>
+              <a:buChar char="§"/>
+            </a:pPr>
+            <a:r>
+              <a:rPr lang="en-IN" sz="2000" dirty="0">
+                <a:solidFill>
+                  <a:schemeClr val="bg2">
+                    <a:lumMod val="10000"/>
+                  </a:schemeClr>
+                </a:solidFill>
+              </a:rPr>
+              <a:t>History of user bought product</a:t>
+            </a:r>
+          </a:p>
+          <a:p>
+            <a:pPr marL="342900" indent="-342900">
+              <a:buFont typeface="Wingdings" panose="05000000000000000000" pitchFamily="2" charset="2"/>
+              <a:buChar char="§"/>
+            </a:pPr>
+            <a:r>
+              <a:rPr lang="en-IN" sz="2000" dirty="0">
+                <a:solidFill>
+                  <a:schemeClr val="bg2">
+                    <a:lumMod val="10000"/>
+                  </a:schemeClr>
+                </a:solidFill>
+              </a:rPr>
+              <a:t>Seller Portal</a:t>
+            </a:r>
+          </a:p>
+          <a:p>
+            <a:pPr marL="800100" lvl="1" indent="-342900">
+              <a:buFont typeface="Wingdings" panose="05000000000000000000" pitchFamily="2" charset="2"/>
+              <a:buChar char="§"/>
+            </a:pPr>
+            <a:r>
+              <a:rPr lang="en-IN" sz="2000" dirty="0">
+                <a:solidFill>
+                  <a:schemeClr val="bg2">
+                    <a:lumMod val="10000"/>
+                  </a:schemeClr>
+                </a:solidFill>
+              </a:rPr>
+              <a:t>Adding products for bidding</a:t>
+            </a:r>
+          </a:p>
+          <a:p>
+            <a:pPr marL="800100" lvl="1" indent="-342900">
+              <a:buFont typeface="Wingdings" panose="05000000000000000000" pitchFamily="2" charset="2"/>
+              <a:buChar char="§"/>
+            </a:pPr>
+            <a:r>
+              <a:rPr lang="en-IN" sz="2000" dirty="0">
+                <a:solidFill>
+                  <a:schemeClr val="bg2">
+                    <a:lumMod val="10000"/>
+                  </a:schemeClr>
+                </a:solidFill>
+              </a:rPr>
+              <a:t>Scheduling an auction</a:t>
+            </a:r>
+          </a:p>
+          <a:p>
+            <a:pPr marL="800100" lvl="1" indent="-342900">
+              <a:buFont typeface="Wingdings" panose="05000000000000000000" pitchFamily="2" charset="2"/>
+              <a:buChar char="§"/>
+            </a:pPr>
+            <a:r>
+              <a:rPr lang="en-IN" sz="2000" dirty="0">
+                <a:solidFill>
+                  <a:schemeClr val="bg2">
+                    <a:lumMod val="10000"/>
+                  </a:schemeClr>
+                </a:solidFill>
+              </a:rPr>
+              <a:t>View of Products posted by respective Seller</a:t>
+            </a:r>
+          </a:p>
+          <a:p>
+            <a:pPr marL="342900" indent="-342900">
+              <a:buFont typeface="Wingdings" panose="05000000000000000000" pitchFamily="2" charset="2"/>
+              <a:buChar char="§"/>
+            </a:pPr>
+            <a:r>
+              <a:rPr lang="en-IN" sz="2000" dirty="0">
+                <a:solidFill>
+                  <a:schemeClr val="bg2">
+                    <a:lumMod val="10000"/>
+                  </a:schemeClr>
+                </a:solidFill>
+              </a:rPr>
+              <a:t>Scheduling auction</a:t>
+            </a:r>
+          </a:p>
+          <a:p>
+            <a:pPr marL="800100" lvl="1" indent="-342900">
+              <a:buFont typeface="Wingdings" panose="05000000000000000000" pitchFamily="2" charset="2"/>
+              <a:buChar char="§"/>
+            </a:pPr>
+            <a:r>
+              <a:rPr lang="en-IN" sz="2000" dirty="0">
+                <a:solidFill>
+                  <a:schemeClr val="bg2">
+                    <a:lumMod val="10000"/>
+                  </a:schemeClr>
+                </a:solidFill>
+              </a:rPr>
+              <a:t>Start and End time of Auction</a:t>
+            </a:r>
+          </a:p>
+          <a:p>
+            <a:pPr marL="342900" indent="-342900">
+              <a:buFont typeface="Wingdings" panose="05000000000000000000" pitchFamily="2" charset="2"/>
+              <a:buChar char="§"/>
+            </a:pPr>
+            <a:r>
+              <a:rPr lang="en-IN" sz="2000" dirty="0">
+                <a:solidFill>
+                  <a:schemeClr val="bg2">
+                    <a:lumMod val="10000"/>
+                  </a:schemeClr>
+                </a:solidFill>
+              </a:rPr>
+              <a:t>Logging for each action</a:t>
+            </a:r>
           </a:p>
           <a:p>
             <a:pPr marL="285750" indent="-285750">
               <a:buFont typeface="Arial" panose="020B0604020202020204" pitchFamily="34" charset="0"/>
               <a:buChar char="•"/>
             </a:pPr>
-            <a:r>
-              <a:rPr lang="en-IN" dirty="0" smtClean="0"/>
-              <a:t>Buyer </a:t>
-            </a:r>
-            <a:r>
-              <a:rPr lang="en-IN" dirty="0"/>
-              <a:t>Portal</a:t>
-            </a:r>
-            <a:endParaRPr lang="en-IN" dirty="0" smtClean="0"/>
-          </a:p>
-          <a:p>
-            <a:pPr marL="742950" lvl="1" indent="-285750">
-              <a:buFont typeface="Arial" panose="020B0604020202020204" pitchFamily="34" charset="0"/>
-              <a:buChar char="•"/>
-            </a:pPr>
-            <a:r>
-              <a:rPr lang="en-IN" dirty="0" smtClean="0"/>
-              <a:t>Active products for bidding</a:t>
-            </a:r>
-          </a:p>
-          <a:p>
-            <a:pPr marL="742950" lvl="1" indent="-285750">
-              <a:buFont typeface="Arial" panose="020B0604020202020204" pitchFamily="34" charset="0"/>
-              <a:buChar char="•"/>
-            </a:pPr>
-            <a:r>
-              <a:rPr lang="en-IN" dirty="0" smtClean="0"/>
-              <a:t>History of user bought products</a:t>
-            </a:r>
+            <a:endParaRPr lang="en-IN" sz="2000" dirty="0"/>
           </a:p>
           <a:p>
             <a:pPr marL="285750" indent="-285750">
               <a:buFont typeface="Arial" panose="020B0604020202020204" pitchFamily="34" charset="0"/>
               <a:buChar char="•"/>
             </a:pPr>
-            <a:r>
-              <a:rPr lang="en-IN" dirty="0" smtClean="0"/>
-              <a:t>Seller Portal</a:t>
-            </a:r>
-            <a:endParaRPr lang="en-IN" dirty="0"/>
-          </a:p>
-          <a:p>
-            <a:pPr marL="742950" lvl="1" indent="-285750">
-              <a:buFont typeface="Arial" panose="020B0604020202020204" pitchFamily="34" charset="0"/>
-              <a:buChar char="•"/>
-            </a:pPr>
-            <a:r>
-              <a:rPr lang="en-IN" dirty="0" smtClean="0"/>
-              <a:t>Adding products for bidding</a:t>
-            </a:r>
-          </a:p>
-          <a:p>
-            <a:pPr marL="742950" lvl="1" indent="-285750">
-              <a:buFont typeface="Arial" panose="020B0604020202020204" pitchFamily="34" charset="0"/>
-              <a:buChar char="•"/>
-            </a:pPr>
-            <a:r>
-              <a:rPr lang="en-IN" dirty="0" smtClean="0"/>
-              <a:t>Scheduling an auction</a:t>
-            </a:r>
-          </a:p>
-          <a:p>
-            <a:pPr marL="742950" lvl="1" indent="-285750">
-              <a:buFont typeface="Arial" panose="020B0604020202020204" pitchFamily="34" charset="0"/>
-              <a:buChar char="•"/>
-            </a:pPr>
-            <a:r>
-              <a:rPr lang="en-IN" dirty="0" smtClean="0"/>
-              <a:t>View of Products posted by respective Seller</a:t>
-            </a:r>
-          </a:p>
-          <a:p>
-            <a:pPr marL="285750" indent="-285750">
-              <a:buFont typeface="Arial" panose="020B0604020202020204" pitchFamily="34" charset="0"/>
-              <a:buChar char="•"/>
-            </a:pPr>
-            <a:r>
-              <a:rPr lang="en-IN" dirty="0" smtClean="0"/>
-              <a:t>Scheduling auction</a:t>
-            </a:r>
-          </a:p>
-          <a:p>
-            <a:pPr marL="742950" lvl="1" indent="-285750">
-              <a:buFont typeface="Arial" panose="020B0604020202020204" pitchFamily="34" charset="0"/>
-              <a:buChar char="•"/>
-            </a:pPr>
-            <a:r>
-              <a:rPr lang="en-IN" dirty="0" smtClean="0"/>
-              <a:t>Start and End time of Auction</a:t>
-            </a:r>
-          </a:p>
-          <a:p>
-            <a:pPr marL="285750" indent="-285750">
-              <a:buFont typeface="Arial" panose="020B0604020202020204" pitchFamily="34" charset="0"/>
-              <a:buChar char="•"/>
-            </a:pPr>
-            <a:r>
-              <a:rPr lang="en-IN" dirty="0" smtClean="0"/>
-              <a:t>Logging for each action</a:t>
-            </a:r>
-          </a:p>
-          <a:p>
-            <a:pPr marL="285750" indent="-285750">
-              <a:buFont typeface="Arial" panose="020B0604020202020204" pitchFamily="34" charset="0"/>
-              <a:buChar char="•"/>
-            </a:pPr>
-            <a:endParaRPr lang="en-IN" dirty="0" smtClean="0"/>
-          </a:p>
-          <a:p>
-            <a:pPr marL="285750" indent="-285750">
-              <a:buFont typeface="Arial" panose="020B0604020202020204" pitchFamily="34" charset="0"/>
-              <a:buChar char="•"/>
-            </a:pPr>
-            <a:endParaRPr lang="en-IN" dirty="0" smtClean="0"/>
+            <a:endParaRPr lang="en-IN" sz="2000" dirty="0"/>
           </a:p>
           <a:p>
             <a:endParaRPr lang="en-IN" dirty="0"/>
@@ -4124,10 +4187,9 @@
           <a:lstStyle/>
           <a:p>
             <a:r>
-              <a:rPr lang="en-IN" dirty="0" smtClean="0"/>
+              <a:rPr lang="en-IN" dirty="0"/>
               <a:t>Concepts </a:t>
             </a:r>
-            <a:endParaRPr lang="en-IN" dirty="0"/>
           </a:p>
         </p:txBody>
       </p:sp>
@@ -4523,10 +4585,9 @@
           </a:lstStyle>
           <a:p>
             <a:r>
-              <a:rPr lang="en-IN" dirty="0" smtClean="0"/>
+              <a:rPr lang="en-IN" dirty="0"/>
               <a:t>Collaboration</a:t>
             </a:r>
-            <a:endParaRPr lang="en-IN" dirty="0"/>
           </a:p>
         </p:txBody>
       </p:sp>
@@ -4583,53 +4644,53 @@
           <a:lstStyle/>
           <a:p>
             <a:r>
-              <a:rPr lang="en-IN" sz="2000" dirty="0" smtClean="0"/>
+              <a:rPr lang="en-IN" sz="2000" dirty="0"/>
               <a:t>Java</a:t>
             </a:r>
           </a:p>
           <a:p>
             <a:r>
-              <a:rPr lang="en-IN" sz="2000" dirty="0" smtClean="0"/>
+              <a:rPr lang="en-IN" sz="2000" dirty="0"/>
               <a:t>JSP</a:t>
             </a:r>
           </a:p>
           <a:p>
             <a:r>
-              <a:rPr lang="en-IN" sz="2000" dirty="0" smtClean="0"/>
+              <a:rPr lang="en-IN" sz="2000" dirty="0"/>
               <a:t>HTML, CSS</a:t>
             </a:r>
           </a:p>
           <a:p>
             <a:r>
-              <a:rPr lang="en-IN" sz="2000" dirty="0" err="1" smtClean="0"/>
+              <a:rPr lang="en-IN" sz="2000" dirty="0" err="1"/>
               <a:t>Javascript</a:t>
             </a:r>
-            <a:endParaRPr lang="en-IN" sz="2000" dirty="0" smtClean="0"/>
-          </a:p>
-          <a:p>
-            <a:r>
-              <a:rPr lang="en-IN" sz="2000" dirty="0" smtClean="0"/>
+            <a:endParaRPr lang="en-IN" sz="2000" dirty="0"/>
+          </a:p>
+          <a:p>
+            <a:r>
+              <a:rPr lang="en-IN" sz="2000" dirty="0"/>
               <a:t>Servlets</a:t>
             </a:r>
           </a:p>
           <a:p>
             <a:r>
-              <a:rPr lang="en-IN" sz="2000" dirty="0" smtClean="0"/>
+              <a:rPr lang="en-IN" sz="2000" dirty="0"/>
               <a:t>SQL</a:t>
             </a:r>
           </a:p>
           <a:p>
             <a:r>
-              <a:rPr lang="en-IN" sz="2000" dirty="0" smtClean="0"/>
+              <a:rPr lang="en-IN" sz="2000" dirty="0"/>
               <a:t>Derby Database</a:t>
             </a:r>
           </a:p>
           <a:p>
             <a:r>
-              <a:rPr lang="en-IN" sz="2000" dirty="0" err="1" smtClean="0"/>
+              <a:rPr lang="en-IN" sz="2000" dirty="0" err="1"/>
               <a:t>Github</a:t>
             </a:r>
-            <a:endParaRPr lang="en-IN" sz="2000" dirty="0" smtClean="0"/>
+            <a:endParaRPr lang="en-IN" sz="2000" dirty="0"/>
           </a:p>
           <a:p>
             <a:endParaRPr lang="en-IN" dirty="0"/>
@@ -4659,27 +4720,23 @@
           <a:lstStyle/>
           <a:p>
             <a:r>
-              <a:rPr lang="en-IN" dirty="0" err="1" smtClean="0"/>
+              <a:rPr lang="en-IN" dirty="0" err="1"/>
               <a:t>Github</a:t>
             </a:r>
             <a:r>
               <a:rPr lang="en-IN" dirty="0"/>
-              <a:t> </a:t>
-            </a:r>
-            <a:r>
-              <a:rPr lang="en-IN" dirty="0" smtClean="0"/>
-              <a:t>(CLI &amp; Desktop)</a:t>
-            </a:r>
-          </a:p>
-          <a:p>
-            <a:r>
-              <a:rPr lang="en-IN" dirty="0" smtClean="0"/>
+              <a:t> (CLI &amp; Desktop)</a:t>
+            </a:r>
+          </a:p>
+          <a:p>
+            <a:r>
+              <a:rPr lang="en-IN" dirty="0"/>
               <a:t>Eclipse EE</a:t>
             </a:r>
           </a:p>
           <a:p>
             <a:r>
-              <a:rPr lang="en-IN" dirty="0" smtClean="0"/>
+              <a:rPr lang="en-IN" dirty="0"/>
               <a:t>VS code </a:t>
             </a:r>
           </a:p>
@@ -4711,29 +4768,28 @@
           <a:lstStyle/>
           <a:p>
             <a:r>
-              <a:rPr lang="en-IN" dirty="0" smtClean="0"/>
+              <a:rPr lang="en-IN" dirty="0"/>
               <a:t>Trello</a:t>
             </a:r>
           </a:p>
           <a:p>
             <a:r>
-              <a:rPr lang="en-IN" dirty="0" smtClean="0"/>
+              <a:rPr lang="en-IN" dirty="0"/>
               <a:t>Draw.io</a:t>
             </a:r>
           </a:p>
           <a:p>
             <a:r>
-              <a:rPr lang="en-IN" dirty="0" err="1" smtClean="0"/>
+              <a:rPr lang="en-IN" dirty="0" err="1"/>
               <a:t>Github</a:t>
             </a:r>
-            <a:endParaRPr lang="en-IN" dirty="0" smtClean="0"/>
-          </a:p>
-          <a:p>
-            <a:r>
-              <a:rPr lang="en-IN" dirty="0" smtClean="0"/>
+            <a:endParaRPr lang="en-IN" dirty="0"/>
+          </a:p>
+          <a:p>
+            <a:r>
+              <a:rPr lang="en-IN" dirty="0"/>
               <a:t>Zoom</a:t>
             </a:r>
-            <a:endParaRPr lang="en-IN" dirty="0"/>
           </a:p>
         </p:txBody>
       </p:sp>
@@ -4757,6 +4813,7 @@
       <p:bgPr>
         <a:blipFill dpi="0" rotWithShape="1">
           <a:blip r:embed="rId2">
+            <a:alphaModFix amt="76000"/>
             <a:lum/>
           </a:blip>
           <a:srcRect/>
@@ -4801,7 +4858,9 @@
           <a:prstGeom prst="rect">
             <a:avLst/>
           </a:prstGeom>
-          <a:noFill/>
+          <a:solidFill>
+            <a:srgbClr val="002060"/>
+          </a:solidFill>
         </p:spPr>
         <p:txBody>
           <a:bodyPr wrap="square" rtlCol="0">
@@ -4815,7 +4874,7 @@
                   <a:schemeClr val="bg1"/>
                 </a:solidFill>
               </a:rPr>
-              <a:t>Team BitByBit</a:t>
+              <a:t>-Team BitByBit</a:t>
             </a:r>
           </a:p>
         </p:txBody>
@@ -4834,34 +4893,45 @@
         </p:nvSpPr>
         <p:spPr>
           <a:xfrm>
-            <a:off x="4698611" y="2811194"/>
-            <a:ext cx="3530990" cy="769441"/>
+            <a:off x="4825220" y="2768991"/>
+            <a:ext cx="2954214" cy="769441"/>
           </a:xfrm>
           <a:prstGeom prst="rect">
             <a:avLst/>
           </a:prstGeom>
-          <a:noFill/>
+          <a:solidFill>
+            <a:schemeClr val="bg1"/>
+          </a:solidFill>
+          <a:ln w="38100">
+            <a:noFill/>
+          </a:ln>
         </p:spPr>
         <p:txBody>
           <a:bodyPr wrap="square" rtlCol="0">
             <a:spAutoFit/>
+            <a:scene3d>
+              <a:camera prst="orthographicFront"/>
+              <a:lightRig rig="harsh" dir="t"/>
+            </a:scene3d>
+            <a:sp3d extrusionH="57150" prstMaterial="matte">
+              <a:bevelT w="63500" h="12700" prst="angle"/>
+              <a:contourClr>
+                <a:schemeClr val="bg1">
+                  <a:lumMod val="65000"/>
+                </a:schemeClr>
+              </a:contourClr>
+            </a:sp3d>
           </a:bodyPr>
           <a:lstStyle/>
           <a:p>
             <a:r>
-              <a:rPr lang="en-IN" sz="4400" dirty="0">
+              <a:rPr lang="en-IN" sz="4400" b="1" dirty="0">
+                <a:ln/>
                 <a:solidFill>
-                  <a:schemeClr val="bg1"/>
+                  <a:schemeClr val="accent3"/>
                 </a:solidFill>
-                <a:effectLst>
-                  <a:outerShdw blurRad="38100" dist="38100" dir="2700000" algn="tl">
-                    <a:srgbClr val="000000">
-                      <a:alpha val="43137"/>
-                    </a:srgbClr>
-                  </a:outerShdw>
-                </a:effectLst>
               </a:rPr>
-              <a:t>Thank You !</a:t>
+              <a:t>Thank You ;</a:t>
             </a:r>
           </a:p>
         </p:txBody>

</xml_diff>

<commit_message>
Changes done in Presentation
</commit_message>
<xml_diff>
--- a/documents/Codefury_2020.pptx
+++ b/documents/Codefury_2020.pptx
@@ -8,9 +8,15 @@
     <p:sldId id="256" r:id="rId2"/>
     <p:sldId id="257" r:id="rId3"/>
     <p:sldId id="258" r:id="rId4"/>
-    <p:sldId id="259" r:id="rId5"/>
-    <p:sldId id="260" r:id="rId6"/>
-    <p:sldId id="261" r:id="rId7"/>
+    <p:sldId id="262" r:id="rId5"/>
+    <p:sldId id="259" r:id="rId6"/>
+    <p:sldId id="263" r:id="rId7"/>
+    <p:sldId id="264" r:id="rId8"/>
+    <p:sldId id="265" r:id="rId9"/>
+    <p:sldId id="266" r:id="rId10"/>
+    <p:sldId id="267" r:id="rId11"/>
+    <p:sldId id="260" r:id="rId12"/>
+    <p:sldId id="261" r:id="rId13"/>
   </p:sldIdLst>
   <p:sldSz cx="12192000" cy="6858000"/>
   <p:notesSz cx="6858000" cy="9144000"/>
@@ -3476,248 +3482,7 @@
 </p:sld>
 </file>
 
-<file path=ppt/slides/slide2.xml><?xml version="1.0" encoding="utf-8"?>
-<p:sld xmlns:a="http://schemas.openxmlformats.org/drawingml/2006/main" xmlns:r="http://schemas.openxmlformats.org/officeDocument/2006/relationships" xmlns:p="http://schemas.openxmlformats.org/presentationml/2006/main">
-  <p:cSld>
-    <p:bg>
-      <p:bgPr>
-        <a:blipFill dpi="0" rotWithShape="1">
-          <a:blip r:embed="rId2">
-            <a:alphaModFix amt="72000"/>
-            <a:lum/>
-          </a:blip>
-          <a:srcRect/>
-          <a:tile tx="0" ty="0" sx="100000" sy="100000" flip="none" algn="tl"/>
-        </a:blipFill>
-        <a:effectLst/>
-      </p:bgPr>
-    </p:bg>
-    <p:spTree>
-      <p:nvGrpSpPr>
-        <p:cNvPr id="1" name=""/>
-        <p:cNvGrpSpPr/>
-        <p:nvPr/>
-      </p:nvGrpSpPr>
-      <p:grpSpPr>
-        <a:xfrm>
-          <a:off x="0" y="0"/>
-          <a:ext cx="0" cy="0"/>
-          <a:chOff x="0" y="0"/>
-          <a:chExt cx="0" cy="0"/>
-        </a:xfrm>
-      </p:grpSpPr>
-      <p:sp>
-        <p:nvSpPr>
-          <p:cNvPr id="2" name="Title 1">
-            <a:extLst>
-              <a:ext uri="{FF2B5EF4-FFF2-40B4-BE49-F238E27FC236}">
-                <a16:creationId xmlns:a16="http://schemas.microsoft.com/office/drawing/2014/main" id="{EA8344EF-F13D-4F62-8924-34216F5AB0E6}"/>
-              </a:ext>
-            </a:extLst>
-          </p:cNvPr>
-          <p:cNvSpPr>
-            <a:spLocks noGrp="1"/>
-          </p:cNvSpPr>
-          <p:nvPr>
-            <p:ph type="title"/>
-          </p:nvPr>
-        </p:nvSpPr>
-        <p:spPr>
-          <a:blipFill dpi="0" rotWithShape="1">
-            <a:blip r:embed="rId2">
-              <a:alphaModFix amt="74000"/>
-            </a:blip>
-            <a:srcRect/>
-            <a:tile tx="0" ty="0" sx="100000" sy="100000" flip="none" algn="tl"/>
-          </a:blipFill>
-          <a:ln>
-            <a:noFill/>
-          </a:ln>
-        </p:spPr>
-        <p:txBody>
-          <a:bodyPr/>
-          <a:lstStyle/>
-          <a:p>
-            <a:r>
-              <a:rPr lang="en-IN" b="1" dirty="0">
-                <a:latin typeface="+mn-lt"/>
-              </a:rPr>
-              <a:t>Team Members  </a:t>
-            </a:r>
-          </a:p>
-        </p:txBody>
-      </p:sp>
-      <p:sp>
-        <p:nvSpPr>
-          <p:cNvPr id="3" name="Content Placeholder 2">
-            <a:extLst>
-              <a:ext uri="{FF2B5EF4-FFF2-40B4-BE49-F238E27FC236}">
-                <a16:creationId xmlns:a16="http://schemas.microsoft.com/office/drawing/2014/main" id="{7D04D27B-E760-4E08-99AD-C21D87062DBD}"/>
-              </a:ext>
-            </a:extLst>
-          </p:cNvPr>
-          <p:cNvSpPr>
-            <a:spLocks noGrp="1"/>
-          </p:cNvSpPr>
-          <p:nvPr>
-            <p:ph idx="1"/>
-          </p:nvPr>
-        </p:nvSpPr>
-        <p:spPr>
-          <a:blipFill>
-            <a:blip r:embed="rId2">
-              <a:alphaModFix amt="74000"/>
-            </a:blip>
-            <a:tile tx="0" ty="0" sx="100000" sy="100000" flip="none" algn="tl"/>
-          </a:blipFill>
-        </p:spPr>
-        <p:txBody>
-          <a:bodyPr>
-            <a:normAutofit lnSpcReduction="10000"/>
-          </a:bodyPr>
-          <a:lstStyle/>
-          <a:p>
-            <a:r>
-              <a:rPr lang="en-IN" dirty="0"/>
-              <a:t>Kunal </a:t>
-            </a:r>
-            <a:r>
-              <a:rPr lang="en-IN" dirty="0" err="1"/>
-              <a:t>Porwal</a:t>
-            </a:r>
-            <a:r>
-              <a:rPr lang="en-IN" dirty="0"/>
-              <a:t> (Team Lead )</a:t>
-            </a:r>
-          </a:p>
-          <a:p>
-            <a:r>
-              <a:rPr lang="en-IN" dirty="0" err="1"/>
-              <a:t>Jayesh</a:t>
-            </a:r>
-            <a:r>
-              <a:rPr lang="en-IN" dirty="0"/>
-              <a:t> </a:t>
-            </a:r>
-            <a:r>
-              <a:rPr lang="en-IN" dirty="0" err="1"/>
-              <a:t>Chaudhari</a:t>
-            </a:r>
-            <a:endParaRPr lang="en-IN" dirty="0"/>
-          </a:p>
-          <a:p>
-            <a:r>
-              <a:rPr lang="en-IN" dirty="0" err="1"/>
-              <a:t>Sanul</a:t>
-            </a:r>
-            <a:r>
-              <a:rPr lang="en-IN" dirty="0"/>
-              <a:t> </a:t>
-            </a:r>
-            <a:r>
-              <a:rPr lang="en-IN" dirty="0" err="1"/>
-              <a:t>Raskar</a:t>
-            </a:r>
-            <a:endParaRPr lang="en-IN" dirty="0"/>
-          </a:p>
-          <a:p>
-            <a:r>
-              <a:rPr lang="en-IN" dirty="0" err="1"/>
-              <a:t>Rohitkaran</a:t>
-            </a:r>
-            <a:r>
-              <a:rPr lang="en-IN" dirty="0"/>
-              <a:t> </a:t>
-            </a:r>
-            <a:r>
-              <a:rPr lang="en-IN" dirty="0" err="1"/>
-              <a:t>Adusumalli</a:t>
-            </a:r>
-            <a:endParaRPr lang="en-IN" dirty="0"/>
-          </a:p>
-          <a:p>
-            <a:r>
-              <a:rPr lang="en-IN" dirty="0" err="1"/>
-              <a:t>Suyog</a:t>
-            </a:r>
-            <a:r>
-              <a:rPr lang="en-IN" dirty="0"/>
-              <a:t> </a:t>
-            </a:r>
-            <a:r>
-              <a:rPr lang="en-IN" dirty="0" err="1"/>
-              <a:t>Khochikar</a:t>
-            </a:r>
-            <a:endParaRPr lang="en-IN" dirty="0"/>
-          </a:p>
-          <a:p>
-            <a:r>
-              <a:rPr lang="en-IN" dirty="0"/>
-              <a:t>Aniket </a:t>
-            </a:r>
-            <a:r>
-              <a:rPr lang="en-IN" dirty="0" err="1"/>
-              <a:t>Wattamwar</a:t>
-            </a:r>
-            <a:endParaRPr lang="en-IN" dirty="0"/>
-          </a:p>
-          <a:p>
-            <a:r>
-              <a:rPr lang="en-IN" dirty="0" err="1"/>
-              <a:t>Rasi</a:t>
-            </a:r>
-            <a:r>
-              <a:rPr lang="en-IN" dirty="0"/>
-              <a:t> </a:t>
-            </a:r>
-            <a:r>
-              <a:rPr lang="en-IN" dirty="0" err="1"/>
-              <a:t>Wani</a:t>
-            </a:r>
-            <a:endParaRPr lang="en-IN" dirty="0"/>
-          </a:p>
-          <a:p>
-            <a:r>
-              <a:rPr lang="en-IN" dirty="0" err="1"/>
-              <a:t>Mrunal</a:t>
-            </a:r>
-            <a:r>
-              <a:rPr lang="en-IN" dirty="0"/>
-              <a:t> </a:t>
-            </a:r>
-            <a:r>
-              <a:rPr lang="en-IN" dirty="0" err="1"/>
-              <a:t>Kakirwar</a:t>
-            </a:r>
-            <a:endParaRPr lang="en-IN" dirty="0"/>
-          </a:p>
-          <a:p>
-            <a:r>
-              <a:rPr lang="en-IN" dirty="0"/>
-              <a:t>Pranav </a:t>
-            </a:r>
-            <a:r>
-              <a:rPr lang="en-IN" dirty="0" err="1"/>
-              <a:t>Shirude</a:t>
-            </a:r>
-            <a:endParaRPr lang="en-IN" dirty="0"/>
-          </a:p>
-        </p:txBody>
-      </p:sp>
-    </p:spTree>
-    <p:extLst>
-      <p:ext uri="{BB962C8B-B14F-4D97-AF65-F5344CB8AC3E}">
-        <p14:creationId xmlns:p14="http://schemas.microsoft.com/office/powerpoint/2010/main" val="3047847159"/>
-      </p:ext>
-    </p:extLst>
-  </p:cSld>
-  <p:clrMapOvr>
-    <a:masterClrMapping/>
-  </p:clrMapOvr>
-</p:sld>
-</file>
-
-<file path=ppt/slides/slide3.xml><?xml version="1.0" encoding="utf-8"?>
+<file path=ppt/slides/slide10.xml><?xml version="1.0" encoding="utf-8"?>
 <p:sld xmlns:a="http://schemas.openxmlformats.org/drawingml/2006/main" xmlns:r="http://schemas.openxmlformats.org/officeDocument/2006/relationships" xmlns:p="http://schemas.openxmlformats.org/presentationml/2006/main">
   <p:cSld>
     <p:bg>
@@ -3750,7 +3515,7 @@
           <p:cNvPr id="2" name="Title 1">
             <a:extLst>
               <a:ext uri="{FF2B5EF4-FFF2-40B4-BE49-F238E27FC236}">
-                <a16:creationId xmlns:a16="http://schemas.microsoft.com/office/drawing/2014/main" id="{7541AC74-C131-4CCB-9FEA-E38478B270D4}"/>
+                <a16:creationId xmlns:a16="http://schemas.microsoft.com/office/drawing/2014/main" id="{100E6EEA-EA56-4018-AE50-A83EE70B08A3}"/>
               </a:ext>
             </a:extLst>
           </p:cNvPr>
@@ -3762,10 +3527,6 @@
           </p:nvPr>
         </p:nvSpPr>
         <p:spPr>
-          <a:xfrm>
-            <a:off x="623454" y="365125"/>
-            <a:ext cx="10515600" cy="1325563"/>
-          </a:xfrm>
           <a:blipFill>
             <a:blip r:embed="rId2">
               <a:alphaModFix amt="72000"/>
@@ -3781,227 +3542,51 @@
               <a:rPr lang="en-IN" b="1" dirty="0">
                 <a:latin typeface="+mn-lt"/>
               </a:rPr>
-              <a:t>Application Features</a:t>
-            </a:r>
-          </a:p>
-        </p:txBody>
-      </p:sp>
-      <p:sp>
-        <p:nvSpPr>
-          <p:cNvPr id="5" name="TextBox 4"/>
-          <p:cNvSpPr txBox="1"/>
+              <a:t>UI Snapshots</a:t>
+            </a:r>
+          </a:p>
+        </p:txBody>
+      </p:sp>
+      <p:pic>
+        <p:nvPicPr>
+          <p:cNvPr id="5" name="Picture 4">
+            <a:extLst>
+              <a:ext uri="{FF2B5EF4-FFF2-40B4-BE49-F238E27FC236}">
+                <a16:creationId xmlns:a16="http://schemas.microsoft.com/office/drawing/2014/main" id="{00E2E722-3AA8-454A-A018-827505746D26}"/>
+              </a:ext>
+            </a:extLst>
+          </p:cNvPr>
+          <p:cNvPicPr>
+            <a:picLocks noChangeAspect="1"/>
+          </p:cNvPicPr>
           <p:nvPr/>
-        </p:nvSpPr>
+        </p:nvPicPr>
+        <p:blipFill>
+          <a:blip r:embed="rId3">
+            <a:extLst>
+              <a:ext uri="{28A0092B-C50C-407E-A947-70E740481C1C}">
+                <a14:useLocalDpi xmlns:a14="http://schemas.microsoft.com/office/drawing/2010/main" val="0"/>
+              </a:ext>
+            </a:extLst>
+          </a:blip>
+          <a:stretch>
+            <a:fillRect/>
+          </a:stretch>
+        </p:blipFill>
         <p:spPr>
           <a:xfrm>
-            <a:off x="590203" y="1690688"/>
-            <a:ext cx="10548851" cy="4955203"/>
+            <a:off x="1060174" y="1404731"/>
+            <a:ext cx="9806401" cy="5233918"/>
           </a:xfrm>
           <a:prstGeom prst="rect">
             <a:avLst/>
           </a:prstGeom>
-          <a:noFill/>
         </p:spPr>
-        <p:txBody>
-          <a:bodyPr wrap="square" rtlCol="0">
-            <a:spAutoFit/>
-          </a:bodyPr>
-          <a:lstStyle/>
-          <a:p>
-            <a:r>
-              <a:rPr lang="en-IN" sz="2200" dirty="0"/>
-              <a:t>A web based app for online bidding</a:t>
-            </a:r>
-          </a:p>
-          <a:p>
-            <a:endParaRPr lang="en-IN" dirty="0"/>
-          </a:p>
-          <a:p>
-            <a:pPr marL="342900" indent="-342900">
-              <a:buFont typeface="Wingdings" panose="05000000000000000000" pitchFamily="2" charset="2"/>
-              <a:buChar char="§"/>
-            </a:pPr>
-            <a:r>
-              <a:rPr lang="en-IN" sz="2000" dirty="0">
-                <a:solidFill>
-                  <a:schemeClr val="bg2">
-                    <a:lumMod val="10000"/>
-                  </a:schemeClr>
-                </a:solidFill>
-              </a:rPr>
-              <a:t>Buyer Portal</a:t>
-            </a:r>
-          </a:p>
-          <a:p>
-            <a:pPr marL="800100" lvl="1" indent="-342900">
-              <a:buFont typeface="Wingdings" panose="05000000000000000000" pitchFamily="2" charset="2"/>
-              <a:buChar char="§"/>
-            </a:pPr>
-            <a:r>
-              <a:rPr lang="en-IN" sz="2000" dirty="0">
-                <a:solidFill>
-                  <a:schemeClr val="bg2">
-                    <a:lumMod val="10000"/>
-                  </a:schemeClr>
-                </a:solidFill>
-              </a:rPr>
-              <a:t>Active products for bidding</a:t>
-            </a:r>
-          </a:p>
-          <a:p>
-            <a:pPr marL="800100" lvl="1" indent="-342900">
-              <a:buFont typeface="Wingdings" panose="05000000000000000000" pitchFamily="2" charset="2"/>
-              <a:buChar char="§"/>
-            </a:pPr>
-            <a:r>
-              <a:rPr lang="en-IN" sz="2000" dirty="0">
-                <a:solidFill>
-                  <a:schemeClr val="bg2">
-                    <a:lumMod val="10000"/>
-                  </a:schemeClr>
-                </a:solidFill>
-              </a:rPr>
-              <a:t>History of user bought product</a:t>
-            </a:r>
-          </a:p>
-          <a:p>
-            <a:pPr marL="342900" indent="-342900">
-              <a:buFont typeface="Wingdings" panose="05000000000000000000" pitchFamily="2" charset="2"/>
-              <a:buChar char="§"/>
-            </a:pPr>
-            <a:r>
-              <a:rPr lang="en-IN" sz="2000" dirty="0">
-                <a:solidFill>
-                  <a:schemeClr val="bg2">
-                    <a:lumMod val="10000"/>
-                  </a:schemeClr>
-                </a:solidFill>
-              </a:rPr>
-              <a:t>Seller Portal</a:t>
-            </a:r>
-          </a:p>
-          <a:p>
-            <a:pPr marL="800100" lvl="1" indent="-342900">
-              <a:buFont typeface="Wingdings" panose="05000000000000000000" pitchFamily="2" charset="2"/>
-              <a:buChar char="§"/>
-            </a:pPr>
-            <a:r>
-              <a:rPr lang="en-IN" sz="2000" dirty="0">
-                <a:solidFill>
-                  <a:schemeClr val="bg2">
-                    <a:lumMod val="10000"/>
-                  </a:schemeClr>
-                </a:solidFill>
-              </a:rPr>
-              <a:t>Adding products for bidding</a:t>
-            </a:r>
-          </a:p>
-          <a:p>
-            <a:pPr marL="800100" lvl="1" indent="-342900">
-              <a:buFont typeface="Wingdings" panose="05000000000000000000" pitchFamily="2" charset="2"/>
-              <a:buChar char="§"/>
-            </a:pPr>
-            <a:r>
-              <a:rPr lang="en-IN" sz="2000" dirty="0">
-                <a:solidFill>
-                  <a:schemeClr val="bg2">
-                    <a:lumMod val="10000"/>
-                  </a:schemeClr>
-                </a:solidFill>
-              </a:rPr>
-              <a:t>Scheduling an auction</a:t>
-            </a:r>
-          </a:p>
-          <a:p>
-            <a:pPr marL="800100" lvl="1" indent="-342900">
-              <a:buFont typeface="Wingdings" panose="05000000000000000000" pitchFamily="2" charset="2"/>
-              <a:buChar char="§"/>
-            </a:pPr>
-            <a:r>
-              <a:rPr lang="en-IN" sz="2000" dirty="0">
-                <a:solidFill>
-                  <a:schemeClr val="bg2">
-                    <a:lumMod val="10000"/>
-                  </a:schemeClr>
-                </a:solidFill>
-              </a:rPr>
-              <a:t>View of Products posted by respective Seller</a:t>
-            </a:r>
-          </a:p>
-          <a:p>
-            <a:pPr marL="342900" indent="-342900">
-              <a:buFont typeface="Wingdings" panose="05000000000000000000" pitchFamily="2" charset="2"/>
-              <a:buChar char="§"/>
-            </a:pPr>
-            <a:r>
-              <a:rPr lang="en-IN" sz="2000" dirty="0">
-                <a:solidFill>
-                  <a:schemeClr val="bg2">
-                    <a:lumMod val="10000"/>
-                  </a:schemeClr>
-                </a:solidFill>
-              </a:rPr>
-              <a:t>Scheduling auction</a:t>
-            </a:r>
-          </a:p>
-          <a:p>
-            <a:pPr marL="800100" lvl="1" indent="-342900">
-              <a:buFont typeface="Wingdings" panose="05000000000000000000" pitchFamily="2" charset="2"/>
-              <a:buChar char="§"/>
-            </a:pPr>
-            <a:r>
-              <a:rPr lang="en-IN" sz="2000" dirty="0">
-                <a:solidFill>
-                  <a:schemeClr val="bg2">
-                    <a:lumMod val="10000"/>
-                  </a:schemeClr>
-                </a:solidFill>
-              </a:rPr>
-              <a:t>Start and End time of Auction</a:t>
-            </a:r>
-          </a:p>
-          <a:p>
-            <a:pPr marL="342900" indent="-342900">
-              <a:buFont typeface="Wingdings" panose="05000000000000000000" pitchFamily="2" charset="2"/>
-              <a:buChar char="§"/>
-            </a:pPr>
-            <a:r>
-              <a:rPr lang="en-IN" sz="2000" dirty="0">
-                <a:solidFill>
-                  <a:schemeClr val="bg2">
-                    <a:lumMod val="10000"/>
-                  </a:schemeClr>
-                </a:solidFill>
-              </a:rPr>
-              <a:t>Logging for each action</a:t>
-            </a:r>
-          </a:p>
-          <a:p>
-            <a:pPr marL="285750" indent="-285750">
-              <a:buFont typeface="Arial" panose="020B0604020202020204" pitchFamily="34" charset="0"/>
-              <a:buChar char="•"/>
-            </a:pPr>
-            <a:endParaRPr lang="en-IN" sz="2000" dirty="0"/>
-          </a:p>
-          <a:p>
-            <a:pPr marL="285750" indent="-285750">
-              <a:buFont typeface="Arial" panose="020B0604020202020204" pitchFamily="34" charset="0"/>
-              <a:buChar char="•"/>
-            </a:pPr>
-            <a:endParaRPr lang="en-IN" sz="2000" dirty="0"/>
-          </a:p>
-          <a:p>
-            <a:endParaRPr lang="en-IN" dirty="0"/>
-          </a:p>
-          <a:p>
-            <a:endParaRPr lang="en-IN" dirty="0"/>
-          </a:p>
-        </p:txBody>
-      </p:sp>
+      </p:pic>
     </p:spTree>
     <p:extLst>
       <p:ext uri="{BB962C8B-B14F-4D97-AF65-F5344CB8AC3E}">
-        <p14:creationId xmlns:p14="http://schemas.microsoft.com/office/powerpoint/2010/main" val="1601314134"/>
+        <p14:creationId xmlns:p14="http://schemas.microsoft.com/office/powerpoint/2010/main" val="2522667185"/>
       </p:ext>
     </p:extLst>
   </p:cSld>
@@ -4011,7 +3596,7 @@
 </p:sld>
 </file>
 
-<file path=ppt/slides/slide4.xml><?xml version="1.0" encoding="utf-8"?>
+<file path=ppt/slides/slide11.xml><?xml version="1.0" encoding="utf-8"?>
 <p:sld xmlns:a="http://schemas.openxmlformats.org/drawingml/2006/main" xmlns:r="http://schemas.openxmlformats.org/officeDocument/2006/relationships" xmlns:p="http://schemas.openxmlformats.org/presentationml/2006/main">
   <p:cSld>
     <p:bg>
@@ -4044,84 +3629,6 @@
           <p:cNvPr id="2" name="Title 1">
             <a:extLst>
               <a:ext uri="{FF2B5EF4-FFF2-40B4-BE49-F238E27FC236}">
-                <a16:creationId xmlns:a16="http://schemas.microsoft.com/office/drawing/2014/main" id="{100E6EEA-EA56-4018-AE50-A83EE70B08A3}"/>
-              </a:ext>
-            </a:extLst>
-          </p:cNvPr>
-          <p:cNvSpPr>
-            <a:spLocks noGrp="1"/>
-          </p:cNvSpPr>
-          <p:nvPr>
-            <p:ph type="title"/>
-          </p:nvPr>
-        </p:nvSpPr>
-        <p:spPr>
-          <a:blipFill>
-            <a:blip r:embed="rId2">
-              <a:alphaModFix amt="72000"/>
-            </a:blip>
-            <a:tile tx="0" ty="0" sx="100000" sy="100000" flip="none" algn="tl"/>
-          </a:blipFill>
-        </p:spPr>
-        <p:txBody>
-          <a:bodyPr/>
-          <a:lstStyle/>
-          <a:p>
-            <a:r>
-              <a:rPr lang="en-IN" b="1" dirty="0">
-                <a:latin typeface="+mn-lt"/>
-              </a:rPr>
-              <a:t>UI Snapshots</a:t>
-            </a:r>
-          </a:p>
-        </p:txBody>
-      </p:sp>
-    </p:spTree>
-    <p:extLst>
-      <p:ext uri="{BB962C8B-B14F-4D97-AF65-F5344CB8AC3E}">
-        <p14:creationId xmlns:p14="http://schemas.microsoft.com/office/powerpoint/2010/main" val="2473081811"/>
-      </p:ext>
-    </p:extLst>
-  </p:cSld>
-  <p:clrMapOvr>
-    <a:masterClrMapping/>
-  </p:clrMapOvr>
-</p:sld>
-</file>
-
-<file path=ppt/slides/slide5.xml><?xml version="1.0" encoding="utf-8"?>
-<p:sld xmlns:a="http://schemas.openxmlformats.org/drawingml/2006/main" xmlns:r="http://schemas.openxmlformats.org/officeDocument/2006/relationships" xmlns:p="http://schemas.openxmlformats.org/presentationml/2006/main">
-  <p:cSld>
-    <p:bg>
-      <p:bgPr>
-        <a:blipFill>
-          <a:blip r:embed="rId2">
-            <a:alphaModFix amt="72000"/>
-          </a:blip>
-          <a:tile tx="0" ty="0" sx="100000" sy="100000" flip="none" algn="tl"/>
-        </a:blipFill>
-        <a:effectLst/>
-      </p:bgPr>
-    </p:bg>
-    <p:spTree>
-      <p:nvGrpSpPr>
-        <p:cNvPr id="1" name=""/>
-        <p:cNvGrpSpPr/>
-        <p:nvPr/>
-      </p:nvGrpSpPr>
-      <p:grpSpPr>
-        <a:xfrm>
-          <a:off x="0" y="0"/>
-          <a:ext cx="0" cy="0"/>
-          <a:chOff x="0" y="0"/>
-          <a:chExt cx="0" cy="0"/>
-        </a:xfrm>
-      </p:grpSpPr>
-      <p:sp>
-        <p:nvSpPr>
-          <p:cNvPr id="2" name="Title 1">
-            <a:extLst>
-              <a:ext uri="{FF2B5EF4-FFF2-40B4-BE49-F238E27FC236}">
                 <a16:creationId xmlns:a16="http://schemas.microsoft.com/office/drawing/2014/main" id="{80CA6616-439E-44E3-9129-1978474CBAD8}"/>
               </a:ext>
             </a:extLst>
@@ -4806,7 +4313,7 @@
 </p:sld>
 </file>
 
-<file path=ppt/slides/slide6.xml><?xml version="1.0" encoding="utf-8"?>
+<file path=ppt/slides/slide12.xml><?xml version="1.0" encoding="utf-8"?>
 <p:sld xmlns:a="http://schemas.openxmlformats.org/drawingml/2006/main" xmlns:r="http://schemas.openxmlformats.org/officeDocument/2006/relationships" xmlns:p="http://schemas.openxmlformats.org/presentationml/2006/main">
   <p:cSld>
     <p:bg>
@@ -5155,10 +4662,1229 @@
       </p:par>
     </p:tnLst>
     <p:bldLst>
-      <p:bldP spid="4" grpId="0"/>
-      <p:bldP spid="8" grpId="0"/>
+      <p:bldP spid="4" grpId="0" animBg="1"/>
+      <p:bldP spid="8" grpId="0" animBg="1"/>
     </p:bldLst>
   </p:timing>
+</p:sld>
+</file>
+
+<file path=ppt/slides/slide2.xml><?xml version="1.0" encoding="utf-8"?>
+<p:sld xmlns:a="http://schemas.openxmlformats.org/drawingml/2006/main" xmlns:r="http://schemas.openxmlformats.org/officeDocument/2006/relationships" xmlns:p="http://schemas.openxmlformats.org/presentationml/2006/main">
+  <p:cSld>
+    <p:bg>
+      <p:bgPr>
+        <a:blipFill dpi="0" rotWithShape="1">
+          <a:blip r:embed="rId2">
+            <a:alphaModFix amt="72000"/>
+            <a:lum/>
+          </a:blip>
+          <a:srcRect/>
+          <a:tile tx="0" ty="0" sx="100000" sy="100000" flip="none" algn="tl"/>
+        </a:blipFill>
+        <a:effectLst/>
+      </p:bgPr>
+    </p:bg>
+    <p:spTree>
+      <p:nvGrpSpPr>
+        <p:cNvPr id="1" name=""/>
+        <p:cNvGrpSpPr/>
+        <p:nvPr/>
+      </p:nvGrpSpPr>
+      <p:grpSpPr>
+        <a:xfrm>
+          <a:off x="0" y="0"/>
+          <a:ext cx="0" cy="0"/>
+          <a:chOff x="0" y="0"/>
+          <a:chExt cx="0" cy="0"/>
+        </a:xfrm>
+      </p:grpSpPr>
+      <p:sp>
+        <p:nvSpPr>
+          <p:cNvPr id="2" name="Title 1">
+            <a:extLst>
+              <a:ext uri="{FF2B5EF4-FFF2-40B4-BE49-F238E27FC236}">
+                <a16:creationId xmlns:a16="http://schemas.microsoft.com/office/drawing/2014/main" id="{EA8344EF-F13D-4F62-8924-34216F5AB0E6}"/>
+              </a:ext>
+            </a:extLst>
+          </p:cNvPr>
+          <p:cNvSpPr>
+            <a:spLocks noGrp="1"/>
+          </p:cNvSpPr>
+          <p:nvPr>
+            <p:ph type="title"/>
+          </p:nvPr>
+        </p:nvSpPr>
+        <p:spPr>
+          <a:blipFill dpi="0" rotWithShape="1">
+            <a:blip r:embed="rId2">
+              <a:alphaModFix amt="74000"/>
+            </a:blip>
+            <a:srcRect/>
+            <a:tile tx="0" ty="0" sx="100000" sy="100000" flip="none" algn="tl"/>
+          </a:blipFill>
+          <a:ln>
+            <a:noFill/>
+          </a:ln>
+        </p:spPr>
+        <p:txBody>
+          <a:bodyPr/>
+          <a:lstStyle/>
+          <a:p>
+            <a:r>
+              <a:rPr lang="en-IN" b="1" dirty="0">
+                <a:latin typeface="+mn-lt"/>
+              </a:rPr>
+              <a:t>Team Members  </a:t>
+            </a:r>
+          </a:p>
+        </p:txBody>
+      </p:sp>
+      <p:sp>
+        <p:nvSpPr>
+          <p:cNvPr id="3" name="Content Placeholder 2">
+            <a:extLst>
+              <a:ext uri="{FF2B5EF4-FFF2-40B4-BE49-F238E27FC236}">
+                <a16:creationId xmlns:a16="http://schemas.microsoft.com/office/drawing/2014/main" id="{7D04D27B-E760-4E08-99AD-C21D87062DBD}"/>
+              </a:ext>
+            </a:extLst>
+          </p:cNvPr>
+          <p:cNvSpPr>
+            <a:spLocks noGrp="1"/>
+          </p:cNvSpPr>
+          <p:nvPr>
+            <p:ph idx="1"/>
+          </p:nvPr>
+        </p:nvSpPr>
+        <p:spPr>
+          <a:blipFill>
+            <a:blip r:embed="rId2">
+              <a:alphaModFix amt="74000"/>
+            </a:blip>
+            <a:tile tx="0" ty="0" sx="100000" sy="100000" flip="none" algn="tl"/>
+          </a:blipFill>
+        </p:spPr>
+        <p:txBody>
+          <a:bodyPr>
+            <a:normAutofit lnSpcReduction="10000"/>
+          </a:bodyPr>
+          <a:lstStyle/>
+          <a:p>
+            <a:r>
+              <a:rPr lang="en-IN" dirty="0"/>
+              <a:t>Kunal </a:t>
+            </a:r>
+            <a:r>
+              <a:rPr lang="en-IN" dirty="0" err="1"/>
+              <a:t>Porwal</a:t>
+            </a:r>
+            <a:r>
+              <a:rPr lang="en-IN" dirty="0"/>
+              <a:t> ( Team Leader )</a:t>
+            </a:r>
+          </a:p>
+          <a:p>
+            <a:r>
+              <a:rPr lang="en-IN" dirty="0" err="1"/>
+              <a:t>Jayesh</a:t>
+            </a:r>
+            <a:r>
+              <a:rPr lang="en-IN" dirty="0"/>
+              <a:t> </a:t>
+            </a:r>
+            <a:r>
+              <a:rPr lang="en-IN" dirty="0" err="1"/>
+              <a:t>Chaudhari</a:t>
+            </a:r>
+            <a:endParaRPr lang="en-IN" dirty="0"/>
+          </a:p>
+          <a:p>
+            <a:r>
+              <a:rPr lang="en-IN" dirty="0" err="1"/>
+              <a:t>Sanul</a:t>
+            </a:r>
+            <a:r>
+              <a:rPr lang="en-IN" dirty="0"/>
+              <a:t> </a:t>
+            </a:r>
+            <a:r>
+              <a:rPr lang="en-IN" dirty="0" err="1"/>
+              <a:t>Raskar</a:t>
+            </a:r>
+            <a:endParaRPr lang="en-IN" dirty="0"/>
+          </a:p>
+          <a:p>
+            <a:r>
+              <a:rPr lang="en-IN" dirty="0" err="1"/>
+              <a:t>Rohitkaran</a:t>
+            </a:r>
+            <a:r>
+              <a:rPr lang="en-IN" dirty="0"/>
+              <a:t> </a:t>
+            </a:r>
+            <a:r>
+              <a:rPr lang="en-IN" dirty="0" err="1"/>
+              <a:t>Adusumalli</a:t>
+            </a:r>
+            <a:endParaRPr lang="en-IN" dirty="0"/>
+          </a:p>
+          <a:p>
+            <a:r>
+              <a:rPr lang="en-IN" dirty="0" err="1"/>
+              <a:t>Suyog</a:t>
+            </a:r>
+            <a:r>
+              <a:rPr lang="en-IN" dirty="0"/>
+              <a:t> </a:t>
+            </a:r>
+            <a:r>
+              <a:rPr lang="en-IN" dirty="0" err="1"/>
+              <a:t>Khochikar</a:t>
+            </a:r>
+            <a:endParaRPr lang="en-IN" dirty="0"/>
+          </a:p>
+          <a:p>
+            <a:r>
+              <a:rPr lang="en-IN" dirty="0"/>
+              <a:t>Aniket </a:t>
+            </a:r>
+            <a:r>
+              <a:rPr lang="en-IN" dirty="0" err="1"/>
+              <a:t>Wattamwar</a:t>
+            </a:r>
+            <a:endParaRPr lang="en-IN" dirty="0"/>
+          </a:p>
+          <a:p>
+            <a:r>
+              <a:rPr lang="en-IN" dirty="0" err="1"/>
+              <a:t>Rasi</a:t>
+            </a:r>
+            <a:r>
+              <a:rPr lang="en-IN" dirty="0"/>
+              <a:t> </a:t>
+            </a:r>
+            <a:r>
+              <a:rPr lang="en-IN" dirty="0" err="1"/>
+              <a:t>Wani</a:t>
+            </a:r>
+            <a:endParaRPr lang="en-IN" dirty="0"/>
+          </a:p>
+          <a:p>
+            <a:r>
+              <a:rPr lang="en-IN" dirty="0" err="1"/>
+              <a:t>Mrunal</a:t>
+            </a:r>
+            <a:r>
+              <a:rPr lang="en-IN" dirty="0"/>
+              <a:t> </a:t>
+            </a:r>
+            <a:r>
+              <a:rPr lang="en-IN" dirty="0" err="1"/>
+              <a:t>Kakirwar</a:t>
+            </a:r>
+            <a:endParaRPr lang="en-IN" dirty="0"/>
+          </a:p>
+          <a:p>
+            <a:r>
+              <a:rPr lang="en-IN" dirty="0"/>
+              <a:t>Pranav </a:t>
+            </a:r>
+            <a:r>
+              <a:rPr lang="en-IN" dirty="0" err="1"/>
+              <a:t>Shirude</a:t>
+            </a:r>
+            <a:endParaRPr lang="en-IN" dirty="0"/>
+          </a:p>
+        </p:txBody>
+      </p:sp>
+    </p:spTree>
+    <p:extLst>
+      <p:ext uri="{BB962C8B-B14F-4D97-AF65-F5344CB8AC3E}">
+        <p14:creationId xmlns:p14="http://schemas.microsoft.com/office/powerpoint/2010/main" val="3047847159"/>
+      </p:ext>
+    </p:extLst>
+  </p:cSld>
+  <p:clrMapOvr>
+    <a:masterClrMapping/>
+  </p:clrMapOvr>
+</p:sld>
+</file>
+
+<file path=ppt/slides/slide3.xml><?xml version="1.0" encoding="utf-8"?>
+<p:sld xmlns:a="http://schemas.openxmlformats.org/drawingml/2006/main" xmlns:r="http://schemas.openxmlformats.org/officeDocument/2006/relationships" xmlns:p="http://schemas.openxmlformats.org/presentationml/2006/main">
+  <p:cSld>
+    <p:bg>
+      <p:bgPr>
+        <a:blipFill>
+          <a:blip r:embed="rId2">
+            <a:alphaModFix amt="72000"/>
+          </a:blip>
+          <a:tile tx="0" ty="0" sx="100000" sy="100000" flip="none" algn="tl"/>
+        </a:blipFill>
+        <a:effectLst/>
+      </p:bgPr>
+    </p:bg>
+    <p:spTree>
+      <p:nvGrpSpPr>
+        <p:cNvPr id="1" name=""/>
+        <p:cNvGrpSpPr/>
+        <p:nvPr/>
+      </p:nvGrpSpPr>
+      <p:grpSpPr>
+        <a:xfrm>
+          <a:off x="0" y="0"/>
+          <a:ext cx="0" cy="0"/>
+          <a:chOff x="0" y="0"/>
+          <a:chExt cx="0" cy="0"/>
+        </a:xfrm>
+      </p:grpSpPr>
+      <p:sp>
+        <p:nvSpPr>
+          <p:cNvPr id="2" name="Title 1">
+            <a:extLst>
+              <a:ext uri="{FF2B5EF4-FFF2-40B4-BE49-F238E27FC236}">
+                <a16:creationId xmlns:a16="http://schemas.microsoft.com/office/drawing/2014/main" id="{7541AC74-C131-4CCB-9FEA-E38478B270D4}"/>
+              </a:ext>
+            </a:extLst>
+          </p:cNvPr>
+          <p:cNvSpPr>
+            <a:spLocks noGrp="1"/>
+          </p:cNvSpPr>
+          <p:nvPr>
+            <p:ph type="title"/>
+          </p:nvPr>
+        </p:nvSpPr>
+        <p:spPr>
+          <a:xfrm>
+            <a:off x="623454" y="365125"/>
+            <a:ext cx="10515600" cy="1325563"/>
+          </a:xfrm>
+          <a:blipFill>
+            <a:blip r:embed="rId2">
+              <a:alphaModFix amt="72000"/>
+            </a:blip>
+            <a:tile tx="0" ty="0" sx="100000" sy="100000" flip="none" algn="tl"/>
+          </a:blipFill>
+        </p:spPr>
+        <p:txBody>
+          <a:bodyPr/>
+          <a:lstStyle/>
+          <a:p>
+            <a:r>
+              <a:rPr lang="en-IN" b="1" dirty="0">
+                <a:latin typeface="+mn-lt"/>
+              </a:rPr>
+              <a:t>Application Features</a:t>
+            </a:r>
+          </a:p>
+        </p:txBody>
+      </p:sp>
+      <p:sp>
+        <p:nvSpPr>
+          <p:cNvPr id="5" name="TextBox 4"/>
+          <p:cNvSpPr txBox="1"/>
+          <p:nvPr/>
+        </p:nvSpPr>
+        <p:spPr>
+          <a:xfrm>
+            <a:off x="590203" y="1690688"/>
+            <a:ext cx="10548851" cy="4955203"/>
+          </a:xfrm>
+          <a:prstGeom prst="rect">
+            <a:avLst/>
+          </a:prstGeom>
+          <a:noFill/>
+        </p:spPr>
+        <p:txBody>
+          <a:bodyPr wrap="square" rtlCol="0">
+            <a:spAutoFit/>
+          </a:bodyPr>
+          <a:lstStyle/>
+          <a:p>
+            <a:r>
+              <a:rPr lang="en-IN" sz="2200" dirty="0"/>
+              <a:t>A web based app for online bidding</a:t>
+            </a:r>
+          </a:p>
+          <a:p>
+            <a:endParaRPr lang="en-IN" dirty="0"/>
+          </a:p>
+          <a:p>
+            <a:pPr marL="342900" indent="-342900">
+              <a:buFont typeface="Wingdings" panose="05000000000000000000" pitchFamily="2" charset="2"/>
+              <a:buChar char="§"/>
+            </a:pPr>
+            <a:r>
+              <a:rPr lang="en-IN" sz="2000" dirty="0">
+                <a:solidFill>
+                  <a:schemeClr val="bg2">
+                    <a:lumMod val="10000"/>
+                  </a:schemeClr>
+                </a:solidFill>
+              </a:rPr>
+              <a:t>Buyer Portal</a:t>
+            </a:r>
+          </a:p>
+          <a:p>
+            <a:pPr marL="800100" lvl="1" indent="-342900">
+              <a:buFont typeface="Wingdings" panose="05000000000000000000" pitchFamily="2" charset="2"/>
+              <a:buChar char="§"/>
+            </a:pPr>
+            <a:r>
+              <a:rPr lang="en-IN" sz="2000" dirty="0">
+                <a:solidFill>
+                  <a:schemeClr val="bg2">
+                    <a:lumMod val="10000"/>
+                  </a:schemeClr>
+                </a:solidFill>
+              </a:rPr>
+              <a:t>Active products for bidding</a:t>
+            </a:r>
+          </a:p>
+          <a:p>
+            <a:pPr marL="800100" lvl="1" indent="-342900">
+              <a:buFont typeface="Wingdings" panose="05000000000000000000" pitchFamily="2" charset="2"/>
+              <a:buChar char="§"/>
+            </a:pPr>
+            <a:r>
+              <a:rPr lang="en-IN" sz="2000" dirty="0">
+                <a:solidFill>
+                  <a:schemeClr val="bg2">
+                    <a:lumMod val="10000"/>
+                  </a:schemeClr>
+                </a:solidFill>
+              </a:rPr>
+              <a:t>History of user bought product</a:t>
+            </a:r>
+          </a:p>
+          <a:p>
+            <a:pPr marL="342900" indent="-342900">
+              <a:buFont typeface="Wingdings" panose="05000000000000000000" pitchFamily="2" charset="2"/>
+              <a:buChar char="§"/>
+            </a:pPr>
+            <a:r>
+              <a:rPr lang="en-IN" sz="2000" dirty="0">
+                <a:solidFill>
+                  <a:schemeClr val="bg2">
+                    <a:lumMod val="10000"/>
+                  </a:schemeClr>
+                </a:solidFill>
+              </a:rPr>
+              <a:t>Seller Portal</a:t>
+            </a:r>
+          </a:p>
+          <a:p>
+            <a:pPr marL="800100" lvl="1" indent="-342900">
+              <a:buFont typeface="Wingdings" panose="05000000000000000000" pitchFamily="2" charset="2"/>
+              <a:buChar char="§"/>
+            </a:pPr>
+            <a:r>
+              <a:rPr lang="en-IN" sz="2000" dirty="0">
+                <a:solidFill>
+                  <a:schemeClr val="bg2">
+                    <a:lumMod val="10000"/>
+                  </a:schemeClr>
+                </a:solidFill>
+              </a:rPr>
+              <a:t>Adding products for bidding</a:t>
+            </a:r>
+          </a:p>
+          <a:p>
+            <a:pPr marL="800100" lvl="1" indent="-342900">
+              <a:buFont typeface="Wingdings" panose="05000000000000000000" pitchFamily="2" charset="2"/>
+              <a:buChar char="§"/>
+            </a:pPr>
+            <a:r>
+              <a:rPr lang="en-IN" sz="2000" dirty="0">
+                <a:solidFill>
+                  <a:schemeClr val="bg2">
+                    <a:lumMod val="10000"/>
+                  </a:schemeClr>
+                </a:solidFill>
+              </a:rPr>
+              <a:t>Scheduling an auction</a:t>
+            </a:r>
+          </a:p>
+          <a:p>
+            <a:pPr marL="800100" lvl="1" indent="-342900">
+              <a:buFont typeface="Wingdings" panose="05000000000000000000" pitchFamily="2" charset="2"/>
+              <a:buChar char="§"/>
+            </a:pPr>
+            <a:r>
+              <a:rPr lang="en-IN" sz="2000" dirty="0">
+                <a:solidFill>
+                  <a:schemeClr val="bg2">
+                    <a:lumMod val="10000"/>
+                  </a:schemeClr>
+                </a:solidFill>
+              </a:rPr>
+              <a:t>View of Products posted by respective Seller</a:t>
+            </a:r>
+          </a:p>
+          <a:p>
+            <a:pPr marL="342900" indent="-342900">
+              <a:buFont typeface="Wingdings" panose="05000000000000000000" pitchFamily="2" charset="2"/>
+              <a:buChar char="§"/>
+            </a:pPr>
+            <a:r>
+              <a:rPr lang="en-IN" sz="2000" dirty="0">
+                <a:solidFill>
+                  <a:schemeClr val="bg2">
+                    <a:lumMod val="10000"/>
+                  </a:schemeClr>
+                </a:solidFill>
+              </a:rPr>
+              <a:t>Scheduling auction</a:t>
+            </a:r>
+          </a:p>
+          <a:p>
+            <a:pPr marL="800100" lvl="1" indent="-342900">
+              <a:buFont typeface="Wingdings" panose="05000000000000000000" pitchFamily="2" charset="2"/>
+              <a:buChar char="§"/>
+            </a:pPr>
+            <a:r>
+              <a:rPr lang="en-IN" sz="2000" dirty="0">
+                <a:solidFill>
+                  <a:schemeClr val="bg2">
+                    <a:lumMod val="10000"/>
+                  </a:schemeClr>
+                </a:solidFill>
+              </a:rPr>
+              <a:t>Start and End time of Auction</a:t>
+            </a:r>
+          </a:p>
+          <a:p>
+            <a:pPr marL="342900" indent="-342900">
+              <a:buFont typeface="Wingdings" panose="05000000000000000000" pitchFamily="2" charset="2"/>
+              <a:buChar char="§"/>
+            </a:pPr>
+            <a:r>
+              <a:rPr lang="en-IN" sz="2000" dirty="0">
+                <a:solidFill>
+                  <a:schemeClr val="bg2">
+                    <a:lumMod val="10000"/>
+                  </a:schemeClr>
+                </a:solidFill>
+              </a:rPr>
+              <a:t>Logging for each action</a:t>
+            </a:r>
+          </a:p>
+          <a:p>
+            <a:pPr marL="285750" indent="-285750">
+              <a:buFont typeface="Arial" panose="020B0604020202020204" pitchFamily="34" charset="0"/>
+              <a:buChar char="•"/>
+            </a:pPr>
+            <a:endParaRPr lang="en-IN" sz="2000" dirty="0"/>
+          </a:p>
+          <a:p>
+            <a:pPr marL="285750" indent="-285750">
+              <a:buFont typeface="Arial" panose="020B0604020202020204" pitchFamily="34" charset="0"/>
+              <a:buChar char="•"/>
+            </a:pPr>
+            <a:endParaRPr lang="en-IN" sz="2000" dirty="0"/>
+          </a:p>
+          <a:p>
+            <a:endParaRPr lang="en-IN" dirty="0"/>
+          </a:p>
+          <a:p>
+            <a:endParaRPr lang="en-IN" dirty="0"/>
+          </a:p>
+        </p:txBody>
+      </p:sp>
+    </p:spTree>
+    <p:extLst>
+      <p:ext uri="{BB962C8B-B14F-4D97-AF65-F5344CB8AC3E}">
+        <p14:creationId xmlns:p14="http://schemas.microsoft.com/office/powerpoint/2010/main" val="1601314134"/>
+      </p:ext>
+    </p:extLst>
+  </p:cSld>
+  <p:clrMapOvr>
+    <a:masterClrMapping/>
+  </p:clrMapOvr>
+</p:sld>
+</file>
+
+<file path=ppt/slides/slide4.xml><?xml version="1.0" encoding="utf-8"?>
+<p:sld xmlns:a="http://schemas.openxmlformats.org/drawingml/2006/main" xmlns:r="http://schemas.openxmlformats.org/officeDocument/2006/relationships" xmlns:p="http://schemas.openxmlformats.org/presentationml/2006/main">
+  <p:cSld>
+    <p:bg>
+      <p:bgPr>
+        <a:blipFill>
+          <a:blip r:embed="rId2">
+            <a:alphaModFix amt="72000"/>
+          </a:blip>
+          <a:tile tx="0" ty="0" sx="100000" sy="100000" flip="none" algn="tl"/>
+        </a:blipFill>
+        <a:effectLst/>
+      </p:bgPr>
+    </p:bg>
+    <p:spTree>
+      <p:nvGrpSpPr>
+        <p:cNvPr id="1" name=""/>
+        <p:cNvGrpSpPr/>
+        <p:nvPr/>
+      </p:nvGrpSpPr>
+      <p:grpSpPr>
+        <a:xfrm>
+          <a:off x="0" y="0"/>
+          <a:ext cx="0" cy="0"/>
+          <a:chOff x="0" y="0"/>
+          <a:chExt cx="0" cy="0"/>
+        </a:xfrm>
+      </p:grpSpPr>
+      <p:sp>
+        <p:nvSpPr>
+          <p:cNvPr id="2" name="Title 1">
+            <a:extLst>
+              <a:ext uri="{FF2B5EF4-FFF2-40B4-BE49-F238E27FC236}">
+                <a16:creationId xmlns:a16="http://schemas.microsoft.com/office/drawing/2014/main" id="{100E6EEA-EA56-4018-AE50-A83EE70B08A3}"/>
+              </a:ext>
+            </a:extLst>
+          </p:cNvPr>
+          <p:cNvSpPr>
+            <a:spLocks noGrp="1"/>
+          </p:cNvSpPr>
+          <p:nvPr>
+            <p:ph type="title"/>
+          </p:nvPr>
+        </p:nvSpPr>
+        <p:spPr>
+          <a:blipFill>
+            <a:blip r:embed="rId2">
+              <a:alphaModFix amt="72000"/>
+            </a:blip>
+            <a:tile tx="0" ty="0" sx="100000" sy="100000" flip="none" algn="tl"/>
+          </a:blipFill>
+        </p:spPr>
+        <p:txBody>
+          <a:bodyPr/>
+          <a:lstStyle/>
+          <a:p>
+            <a:r>
+              <a:rPr lang="en-IN" b="1" dirty="0">
+                <a:latin typeface="+mn-lt"/>
+              </a:rPr>
+              <a:t>UI Snapshots</a:t>
+            </a:r>
+          </a:p>
+        </p:txBody>
+      </p:sp>
+      <p:pic>
+        <p:nvPicPr>
+          <p:cNvPr id="4" name="Picture 3">
+            <a:extLst>
+              <a:ext uri="{FF2B5EF4-FFF2-40B4-BE49-F238E27FC236}">
+                <a16:creationId xmlns:a16="http://schemas.microsoft.com/office/drawing/2014/main" id="{588DD380-A70F-4CB0-B74B-28080C31F182}"/>
+              </a:ext>
+            </a:extLst>
+          </p:cNvPr>
+          <p:cNvPicPr>
+            <a:picLocks noChangeAspect="1"/>
+          </p:cNvPicPr>
+          <p:nvPr/>
+        </p:nvPicPr>
+        <p:blipFill>
+          <a:blip r:embed="rId3">
+            <a:extLst>
+              <a:ext uri="{28A0092B-C50C-407E-A947-70E740481C1C}">
+                <a14:useLocalDpi xmlns:a14="http://schemas.microsoft.com/office/drawing/2010/main" val="0"/>
+              </a:ext>
+            </a:extLst>
+          </a:blip>
+          <a:stretch>
+            <a:fillRect/>
+          </a:stretch>
+        </p:blipFill>
+        <p:spPr>
+          <a:xfrm>
+            <a:off x="374469" y="1351721"/>
+            <a:ext cx="10979331" cy="6004097"/>
+          </a:xfrm>
+          <a:prstGeom prst="rect">
+            <a:avLst/>
+          </a:prstGeom>
+        </p:spPr>
+      </p:pic>
+    </p:spTree>
+    <p:extLst>
+      <p:ext uri="{BB962C8B-B14F-4D97-AF65-F5344CB8AC3E}">
+        <p14:creationId xmlns:p14="http://schemas.microsoft.com/office/powerpoint/2010/main" val="2479226039"/>
+      </p:ext>
+    </p:extLst>
+  </p:cSld>
+  <p:clrMapOvr>
+    <a:masterClrMapping/>
+  </p:clrMapOvr>
+</p:sld>
+</file>
+
+<file path=ppt/slides/slide5.xml><?xml version="1.0" encoding="utf-8"?>
+<p:sld xmlns:a="http://schemas.openxmlformats.org/drawingml/2006/main" xmlns:r="http://schemas.openxmlformats.org/officeDocument/2006/relationships" xmlns:p="http://schemas.openxmlformats.org/presentationml/2006/main">
+  <p:cSld>
+    <p:bg>
+      <p:bgPr>
+        <a:blipFill>
+          <a:blip r:embed="rId2">
+            <a:alphaModFix amt="72000"/>
+          </a:blip>
+          <a:tile tx="0" ty="0" sx="100000" sy="100000" flip="none" algn="tl"/>
+        </a:blipFill>
+        <a:effectLst/>
+      </p:bgPr>
+    </p:bg>
+    <p:spTree>
+      <p:nvGrpSpPr>
+        <p:cNvPr id="1" name=""/>
+        <p:cNvGrpSpPr/>
+        <p:nvPr/>
+      </p:nvGrpSpPr>
+      <p:grpSpPr>
+        <a:xfrm>
+          <a:off x="0" y="0"/>
+          <a:ext cx="0" cy="0"/>
+          <a:chOff x="0" y="0"/>
+          <a:chExt cx="0" cy="0"/>
+        </a:xfrm>
+      </p:grpSpPr>
+      <p:sp>
+        <p:nvSpPr>
+          <p:cNvPr id="2" name="Title 1">
+            <a:extLst>
+              <a:ext uri="{FF2B5EF4-FFF2-40B4-BE49-F238E27FC236}">
+                <a16:creationId xmlns:a16="http://schemas.microsoft.com/office/drawing/2014/main" id="{100E6EEA-EA56-4018-AE50-A83EE70B08A3}"/>
+              </a:ext>
+            </a:extLst>
+          </p:cNvPr>
+          <p:cNvSpPr>
+            <a:spLocks noGrp="1"/>
+          </p:cNvSpPr>
+          <p:nvPr>
+            <p:ph type="title"/>
+          </p:nvPr>
+        </p:nvSpPr>
+        <p:spPr>
+          <a:blipFill>
+            <a:blip r:embed="rId2">
+              <a:alphaModFix amt="72000"/>
+            </a:blip>
+            <a:tile tx="0" ty="0" sx="100000" sy="100000" flip="none" algn="tl"/>
+          </a:blipFill>
+        </p:spPr>
+        <p:txBody>
+          <a:bodyPr/>
+          <a:lstStyle/>
+          <a:p>
+            <a:r>
+              <a:rPr lang="en-IN" b="1" dirty="0">
+                <a:latin typeface="+mn-lt"/>
+              </a:rPr>
+              <a:t>UI Snapshots</a:t>
+            </a:r>
+          </a:p>
+        </p:txBody>
+      </p:sp>
+      <p:pic>
+        <p:nvPicPr>
+          <p:cNvPr id="6" name="Picture 5">
+            <a:extLst>
+              <a:ext uri="{FF2B5EF4-FFF2-40B4-BE49-F238E27FC236}">
+                <a16:creationId xmlns:a16="http://schemas.microsoft.com/office/drawing/2014/main" id="{62CB7079-BF7C-4EA4-936A-E96D1071A839}"/>
+              </a:ext>
+            </a:extLst>
+          </p:cNvPr>
+          <p:cNvPicPr>
+            <a:picLocks noChangeAspect="1"/>
+          </p:cNvPicPr>
+          <p:nvPr/>
+        </p:nvPicPr>
+        <p:blipFill>
+          <a:blip r:embed="rId3">
+            <a:extLst>
+              <a:ext uri="{28A0092B-C50C-407E-A947-70E740481C1C}">
+                <a14:useLocalDpi xmlns:a14="http://schemas.microsoft.com/office/drawing/2010/main" val="0"/>
+              </a:ext>
+            </a:extLst>
+          </a:blip>
+          <a:stretch>
+            <a:fillRect/>
+          </a:stretch>
+        </p:blipFill>
+        <p:spPr>
+          <a:xfrm>
+            <a:off x="1032084" y="1404730"/>
+            <a:ext cx="10127831" cy="5898080"/>
+          </a:xfrm>
+          <a:prstGeom prst="rect">
+            <a:avLst/>
+          </a:prstGeom>
+        </p:spPr>
+      </p:pic>
+    </p:spTree>
+    <p:extLst>
+      <p:ext uri="{BB962C8B-B14F-4D97-AF65-F5344CB8AC3E}">
+        <p14:creationId xmlns:p14="http://schemas.microsoft.com/office/powerpoint/2010/main" val="2473081811"/>
+      </p:ext>
+    </p:extLst>
+  </p:cSld>
+  <p:clrMapOvr>
+    <a:masterClrMapping/>
+  </p:clrMapOvr>
+</p:sld>
+</file>
+
+<file path=ppt/slides/slide6.xml><?xml version="1.0" encoding="utf-8"?>
+<p:sld xmlns:a="http://schemas.openxmlformats.org/drawingml/2006/main" xmlns:r="http://schemas.openxmlformats.org/officeDocument/2006/relationships" xmlns:p="http://schemas.openxmlformats.org/presentationml/2006/main">
+  <p:cSld>
+    <p:bg>
+      <p:bgPr>
+        <a:blipFill>
+          <a:blip r:embed="rId2">
+            <a:alphaModFix amt="72000"/>
+          </a:blip>
+          <a:tile tx="0" ty="0" sx="100000" sy="100000" flip="none" algn="tl"/>
+        </a:blipFill>
+        <a:effectLst/>
+      </p:bgPr>
+    </p:bg>
+    <p:spTree>
+      <p:nvGrpSpPr>
+        <p:cNvPr id="1" name=""/>
+        <p:cNvGrpSpPr/>
+        <p:nvPr/>
+      </p:nvGrpSpPr>
+      <p:grpSpPr>
+        <a:xfrm>
+          <a:off x="0" y="0"/>
+          <a:ext cx="0" cy="0"/>
+          <a:chOff x="0" y="0"/>
+          <a:chExt cx="0" cy="0"/>
+        </a:xfrm>
+      </p:grpSpPr>
+      <p:sp>
+        <p:nvSpPr>
+          <p:cNvPr id="2" name="Title 1">
+            <a:extLst>
+              <a:ext uri="{FF2B5EF4-FFF2-40B4-BE49-F238E27FC236}">
+                <a16:creationId xmlns:a16="http://schemas.microsoft.com/office/drawing/2014/main" id="{100E6EEA-EA56-4018-AE50-A83EE70B08A3}"/>
+              </a:ext>
+            </a:extLst>
+          </p:cNvPr>
+          <p:cNvSpPr>
+            <a:spLocks noGrp="1"/>
+          </p:cNvSpPr>
+          <p:nvPr>
+            <p:ph type="title"/>
+          </p:nvPr>
+        </p:nvSpPr>
+        <p:spPr>
+          <a:blipFill>
+            <a:blip r:embed="rId2">
+              <a:alphaModFix amt="72000"/>
+            </a:blip>
+            <a:tile tx="0" ty="0" sx="100000" sy="100000" flip="none" algn="tl"/>
+          </a:blipFill>
+        </p:spPr>
+        <p:txBody>
+          <a:bodyPr/>
+          <a:lstStyle/>
+          <a:p>
+            <a:r>
+              <a:rPr lang="en-IN" b="1" dirty="0">
+                <a:latin typeface="+mn-lt"/>
+              </a:rPr>
+              <a:t>UI Snapshots</a:t>
+            </a:r>
+          </a:p>
+        </p:txBody>
+      </p:sp>
+      <p:pic>
+        <p:nvPicPr>
+          <p:cNvPr id="4" name="Picture 3">
+            <a:extLst>
+              <a:ext uri="{FF2B5EF4-FFF2-40B4-BE49-F238E27FC236}">
+                <a16:creationId xmlns:a16="http://schemas.microsoft.com/office/drawing/2014/main" id="{8560F5C8-04AC-4350-A7B9-F50B9FEF0F25}"/>
+              </a:ext>
+            </a:extLst>
+          </p:cNvPr>
+          <p:cNvPicPr>
+            <a:picLocks noChangeAspect="1"/>
+          </p:cNvPicPr>
+          <p:nvPr/>
+        </p:nvPicPr>
+        <p:blipFill>
+          <a:blip r:embed="rId3">
+            <a:extLst>
+              <a:ext uri="{28A0092B-C50C-407E-A947-70E740481C1C}">
+                <a14:useLocalDpi xmlns:a14="http://schemas.microsoft.com/office/drawing/2010/main" val="0"/>
+              </a:ext>
+            </a:extLst>
+          </a:blip>
+          <a:stretch>
+            <a:fillRect/>
+          </a:stretch>
+        </p:blipFill>
+        <p:spPr>
+          <a:xfrm>
+            <a:off x="838200" y="1431234"/>
+            <a:ext cx="10081591" cy="6076121"/>
+          </a:xfrm>
+          <a:prstGeom prst="rect">
+            <a:avLst/>
+          </a:prstGeom>
+        </p:spPr>
+      </p:pic>
+    </p:spTree>
+    <p:extLst>
+      <p:ext uri="{BB962C8B-B14F-4D97-AF65-F5344CB8AC3E}">
+        <p14:creationId xmlns:p14="http://schemas.microsoft.com/office/powerpoint/2010/main" val="3852910217"/>
+      </p:ext>
+    </p:extLst>
+  </p:cSld>
+  <p:clrMapOvr>
+    <a:masterClrMapping/>
+  </p:clrMapOvr>
+</p:sld>
+</file>
+
+<file path=ppt/slides/slide7.xml><?xml version="1.0" encoding="utf-8"?>
+<p:sld xmlns:a="http://schemas.openxmlformats.org/drawingml/2006/main" xmlns:r="http://schemas.openxmlformats.org/officeDocument/2006/relationships" xmlns:p="http://schemas.openxmlformats.org/presentationml/2006/main">
+  <p:cSld>
+    <p:bg>
+      <p:bgPr>
+        <a:blipFill>
+          <a:blip r:embed="rId2">
+            <a:alphaModFix amt="72000"/>
+          </a:blip>
+          <a:tile tx="0" ty="0" sx="100000" sy="100000" flip="none" algn="tl"/>
+        </a:blipFill>
+        <a:effectLst/>
+      </p:bgPr>
+    </p:bg>
+    <p:spTree>
+      <p:nvGrpSpPr>
+        <p:cNvPr id="1" name=""/>
+        <p:cNvGrpSpPr/>
+        <p:nvPr/>
+      </p:nvGrpSpPr>
+      <p:grpSpPr>
+        <a:xfrm>
+          <a:off x="0" y="0"/>
+          <a:ext cx="0" cy="0"/>
+          <a:chOff x="0" y="0"/>
+          <a:chExt cx="0" cy="0"/>
+        </a:xfrm>
+      </p:grpSpPr>
+      <p:sp>
+        <p:nvSpPr>
+          <p:cNvPr id="2" name="Title 1">
+            <a:extLst>
+              <a:ext uri="{FF2B5EF4-FFF2-40B4-BE49-F238E27FC236}">
+                <a16:creationId xmlns:a16="http://schemas.microsoft.com/office/drawing/2014/main" id="{100E6EEA-EA56-4018-AE50-A83EE70B08A3}"/>
+              </a:ext>
+            </a:extLst>
+          </p:cNvPr>
+          <p:cNvSpPr>
+            <a:spLocks noGrp="1"/>
+          </p:cNvSpPr>
+          <p:nvPr>
+            <p:ph type="title"/>
+          </p:nvPr>
+        </p:nvSpPr>
+        <p:spPr>
+          <a:blipFill>
+            <a:blip r:embed="rId2">
+              <a:alphaModFix amt="72000"/>
+            </a:blip>
+            <a:tile tx="0" ty="0" sx="100000" sy="100000" flip="none" algn="tl"/>
+          </a:blipFill>
+        </p:spPr>
+        <p:txBody>
+          <a:bodyPr/>
+          <a:lstStyle/>
+          <a:p>
+            <a:r>
+              <a:rPr lang="en-IN" b="1" dirty="0">
+                <a:latin typeface="+mn-lt"/>
+              </a:rPr>
+              <a:t>UI Snapshots</a:t>
+            </a:r>
+          </a:p>
+        </p:txBody>
+      </p:sp>
+      <p:pic>
+        <p:nvPicPr>
+          <p:cNvPr id="5" name="Picture 4">
+            <a:extLst>
+              <a:ext uri="{FF2B5EF4-FFF2-40B4-BE49-F238E27FC236}">
+                <a16:creationId xmlns:a16="http://schemas.microsoft.com/office/drawing/2014/main" id="{1AF4656E-40BB-4012-93C4-775BE126C3C9}"/>
+              </a:ext>
+            </a:extLst>
+          </p:cNvPr>
+          <p:cNvPicPr>
+            <a:picLocks noChangeAspect="1"/>
+          </p:cNvPicPr>
+          <p:nvPr/>
+        </p:nvPicPr>
+        <p:blipFill>
+          <a:blip r:embed="rId3">
+            <a:extLst>
+              <a:ext uri="{28A0092B-C50C-407E-A947-70E740481C1C}">
+                <a14:useLocalDpi xmlns:a14="http://schemas.microsoft.com/office/drawing/2010/main" val="0"/>
+              </a:ext>
+            </a:extLst>
+          </a:blip>
+          <a:stretch>
+            <a:fillRect/>
+          </a:stretch>
+        </p:blipFill>
+        <p:spPr>
+          <a:xfrm>
+            <a:off x="838200" y="1444488"/>
+            <a:ext cx="10515600" cy="5261112"/>
+          </a:xfrm>
+          <a:prstGeom prst="rect">
+            <a:avLst/>
+          </a:prstGeom>
+        </p:spPr>
+      </p:pic>
+    </p:spTree>
+    <p:extLst>
+      <p:ext uri="{BB962C8B-B14F-4D97-AF65-F5344CB8AC3E}">
+        <p14:creationId xmlns:p14="http://schemas.microsoft.com/office/powerpoint/2010/main" val="4227127619"/>
+      </p:ext>
+    </p:extLst>
+  </p:cSld>
+  <p:clrMapOvr>
+    <a:masterClrMapping/>
+  </p:clrMapOvr>
+</p:sld>
+</file>
+
+<file path=ppt/slides/slide8.xml><?xml version="1.0" encoding="utf-8"?>
+<p:sld xmlns:a="http://schemas.openxmlformats.org/drawingml/2006/main" xmlns:r="http://schemas.openxmlformats.org/officeDocument/2006/relationships" xmlns:p="http://schemas.openxmlformats.org/presentationml/2006/main">
+  <p:cSld>
+    <p:bg>
+      <p:bgPr>
+        <a:blipFill>
+          <a:blip r:embed="rId2">
+            <a:alphaModFix amt="72000"/>
+          </a:blip>
+          <a:tile tx="0" ty="0" sx="100000" sy="100000" flip="none" algn="tl"/>
+        </a:blipFill>
+        <a:effectLst/>
+      </p:bgPr>
+    </p:bg>
+    <p:spTree>
+      <p:nvGrpSpPr>
+        <p:cNvPr id="1" name=""/>
+        <p:cNvGrpSpPr/>
+        <p:nvPr/>
+      </p:nvGrpSpPr>
+      <p:grpSpPr>
+        <a:xfrm>
+          <a:off x="0" y="0"/>
+          <a:ext cx="0" cy="0"/>
+          <a:chOff x="0" y="0"/>
+          <a:chExt cx="0" cy="0"/>
+        </a:xfrm>
+      </p:grpSpPr>
+      <p:sp>
+        <p:nvSpPr>
+          <p:cNvPr id="2" name="Title 1">
+            <a:extLst>
+              <a:ext uri="{FF2B5EF4-FFF2-40B4-BE49-F238E27FC236}">
+                <a16:creationId xmlns:a16="http://schemas.microsoft.com/office/drawing/2014/main" id="{100E6EEA-EA56-4018-AE50-A83EE70B08A3}"/>
+              </a:ext>
+            </a:extLst>
+          </p:cNvPr>
+          <p:cNvSpPr>
+            <a:spLocks noGrp="1"/>
+          </p:cNvSpPr>
+          <p:nvPr>
+            <p:ph type="title"/>
+          </p:nvPr>
+        </p:nvSpPr>
+        <p:spPr>
+          <a:blipFill>
+            <a:blip r:embed="rId2">
+              <a:alphaModFix amt="72000"/>
+            </a:blip>
+            <a:tile tx="0" ty="0" sx="100000" sy="100000" flip="none" algn="tl"/>
+          </a:blipFill>
+        </p:spPr>
+        <p:txBody>
+          <a:bodyPr/>
+          <a:lstStyle/>
+          <a:p>
+            <a:r>
+              <a:rPr lang="en-IN" b="1" dirty="0">
+                <a:latin typeface="+mn-lt"/>
+              </a:rPr>
+              <a:t>UI Snapshots</a:t>
+            </a:r>
+          </a:p>
+        </p:txBody>
+      </p:sp>
+      <p:pic>
+        <p:nvPicPr>
+          <p:cNvPr id="7" name="Picture 6">
+            <a:extLst>
+              <a:ext uri="{FF2B5EF4-FFF2-40B4-BE49-F238E27FC236}">
+                <a16:creationId xmlns:a16="http://schemas.microsoft.com/office/drawing/2014/main" id="{EA51DB10-4456-49E3-B7EC-328E6F1C4F26}"/>
+              </a:ext>
+            </a:extLst>
+          </p:cNvPr>
+          <p:cNvPicPr>
+            <a:picLocks noChangeAspect="1"/>
+          </p:cNvPicPr>
+          <p:nvPr/>
+        </p:nvPicPr>
+        <p:blipFill>
+          <a:blip r:embed="rId3">
+            <a:extLst>
+              <a:ext uri="{28A0092B-C50C-407E-A947-70E740481C1C}">
+                <a14:useLocalDpi xmlns:a14="http://schemas.microsoft.com/office/drawing/2010/main" val="0"/>
+              </a:ext>
+            </a:extLst>
+          </a:blip>
+          <a:stretch>
+            <a:fillRect/>
+          </a:stretch>
+        </p:blipFill>
+        <p:spPr>
+          <a:xfrm>
+            <a:off x="1018968" y="1630707"/>
+            <a:ext cx="10154064" cy="5173939"/>
+          </a:xfrm>
+          <a:prstGeom prst="rect">
+            <a:avLst/>
+          </a:prstGeom>
+        </p:spPr>
+      </p:pic>
+    </p:spTree>
+    <p:extLst>
+      <p:ext uri="{BB962C8B-B14F-4D97-AF65-F5344CB8AC3E}">
+        <p14:creationId xmlns:p14="http://schemas.microsoft.com/office/powerpoint/2010/main" val="3900988804"/>
+      </p:ext>
+    </p:extLst>
+  </p:cSld>
+  <p:clrMapOvr>
+    <a:masterClrMapping/>
+  </p:clrMapOvr>
+</p:sld>
+</file>
+
+<file path=ppt/slides/slide9.xml><?xml version="1.0" encoding="utf-8"?>
+<p:sld xmlns:a="http://schemas.openxmlformats.org/drawingml/2006/main" xmlns:r="http://schemas.openxmlformats.org/officeDocument/2006/relationships" xmlns:p="http://schemas.openxmlformats.org/presentationml/2006/main">
+  <p:cSld>
+    <p:bg>
+      <p:bgPr>
+        <a:blipFill>
+          <a:blip r:embed="rId2">
+            <a:alphaModFix amt="72000"/>
+          </a:blip>
+          <a:tile tx="0" ty="0" sx="100000" sy="100000" flip="none" algn="tl"/>
+        </a:blipFill>
+        <a:effectLst/>
+      </p:bgPr>
+    </p:bg>
+    <p:spTree>
+      <p:nvGrpSpPr>
+        <p:cNvPr id="1" name=""/>
+        <p:cNvGrpSpPr/>
+        <p:nvPr/>
+      </p:nvGrpSpPr>
+      <p:grpSpPr>
+        <a:xfrm>
+          <a:off x="0" y="0"/>
+          <a:ext cx="0" cy="0"/>
+          <a:chOff x="0" y="0"/>
+          <a:chExt cx="0" cy="0"/>
+        </a:xfrm>
+      </p:grpSpPr>
+      <p:sp>
+        <p:nvSpPr>
+          <p:cNvPr id="2" name="Title 1">
+            <a:extLst>
+              <a:ext uri="{FF2B5EF4-FFF2-40B4-BE49-F238E27FC236}">
+                <a16:creationId xmlns:a16="http://schemas.microsoft.com/office/drawing/2014/main" id="{100E6EEA-EA56-4018-AE50-A83EE70B08A3}"/>
+              </a:ext>
+            </a:extLst>
+          </p:cNvPr>
+          <p:cNvSpPr>
+            <a:spLocks noGrp="1"/>
+          </p:cNvSpPr>
+          <p:nvPr>
+            <p:ph type="title"/>
+          </p:nvPr>
+        </p:nvSpPr>
+        <p:spPr>
+          <a:blipFill>
+            <a:blip r:embed="rId2">
+              <a:alphaModFix amt="72000"/>
+            </a:blip>
+            <a:tile tx="0" ty="0" sx="100000" sy="100000" flip="none" algn="tl"/>
+          </a:blipFill>
+        </p:spPr>
+        <p:txBody>
+          <a:bodyPr/>
+          <a:lstStyle/>
+          <a:p>
+            <a:r>
+              <a:rPr lang="en-IN" b="1" dirty="0">
+                <a:latin typeface="+mn-lt"/>
+              </a:rPr>
+              <a:t>UI Snapshots</a:t>
+            </a:r>
+          </a:p>
+        </p:txBody>
+      </p:sp>
+      <p:pic>
+        <p:nvPicPr>
+          <p:cNvPr id="4" name="Picture 3">
+            <a:extLst>
+              <a:ext uri="{FF2B5EF4-FFF2-40B4-BE49-F238E27FC236}">
+                <a16:creationId xmlns:a16="http://schemas.microsoft.com/office/drawing/2014/main" id="{C74BD313-58FA-4038-99B5-6DD3392FADF3}"/>
+              </a:ext>
+            </a:extLst>
+          </p:cNvPr>
+          <p:cNvPicPr>
+            <a:picLocks noChangeAspect="1"/>
+          </p:cNvPicPr>
+          <p:nvPr/>
+        </p:nvPicPr>
+        <p:blipFill>
+          <a:blip r:embed="rId3">
+            <a:extLst>
+              <a:ext uri="{28A0092B-C50C-407E-A947-70E740481C1C}">
+                <a14:useLocalDpi xmlns:a14="http://schemas.microsoft.com/office/drawing/2010/main" val="0"/>
+              </a:ext>
+            </a:extLst>
+          </a:blip>
+          <a:stretch>
+            <a:fillRect/>
+          </a:stretch>
+        </p:blipFill>
+        <p:spPr>
+          <a:xfrm>
+            <a:off x="1265582" y="1505669"/>
+            <a:ext cx="9660836" cy="5352331"/>
+          </a:xfrm>
+          <a:prstGeom prst="rect">
+            <a:avLst/>
+          </a:prstGeom>
+        </p:spPr>
+      </p:pic>
+    </p:spTree>
+    <p:extLst>
+      <p:ext uri="{BB962C8B-B14F-4D97-AF65-F5344CB8AC3E}">
+        <p14:creationId xmlns:p14="http://schemas.microsoft.com/office/powerpoint/2010/main" val="219040781"/>
+      </p:ext>
+    </p:extLst>
+  </p:cSld>
+  <p:clrMapOvr>
+    <a:masterClrMapping/>
+  </p:clrMapOvr>
 </p:sld>
 </file>
 

</xml_diff>